<commit_message>
Includes queries shown during demo
</commit_message>
<xml_diff>
--- a/DesigningForADWPerformance.pptx
+++ b/DesigningForADWPerformance.pptx
@@ -208,7 +208,7 @@
           <a:p>
             <a:fld id="{C32C5C26-E110-0243-8E14-F778A7F15B4B}" type="datetimeFigureOut">
               <a:rPr lang="en-US" smtClean="0"/>
-              <a:t>1/8/2019</a:t>
+              <a:t>1/13/2019</a:t>
             </a:fld>
             <a:endParaRPr lang="en-US"/>
           </a:p>
@@ -1540,8 +1540,2920 @@
             </a:pPr>
             <a:r>
               <a:rPr lang="en-US" dirty="0" smtClean="0"/>
-              <a:t>Customer – rapidly changing dimension.  Usually can’t be replicated.  How to hash?</a:t>
-            </a:r>
+              <a:t>Customer – rapidly changing dimension.  Usually can’t be replicated.  How to hash</a:t>
+            </a:r>
+            <a:r>
+              <a:rPr lang="en-US" dirty="0" smtClean="0"/>
+              <a:t>?</a:t>
+            </a:r>
+          </a:p>
+          <a:p>
+            <a:pPr marL="171450" indent="-171450">
+              <a:buFont typeface="Arial" panose="020B0604020202020204" pitchFamily="34" charset="0"/>
+              <a:buChar char="•"/>
+            </a:pPr>
+            <a:endParaRPr lang="en-US" dirty="0" smtClean="0"/>
+          </a:p>
+          <a:p>
+            <a:pPr marL="0" indent="0">
+              <a:buFont typeface="Arial" panose="020B0604020202020204" pitchFamily="34" charset="0"/>
+              <a:buNone/>
+            </a:pPr>
+            <a:r>
+              <a:rPr lang="en-US" dirty="0" smtClean="0"/>
+              <a:t>Some Queries</a:t>
+            </a:r>
+          </a:p>
+          <a:p>
+            <a:r>
+              <a:rPr lang="en-US" sz="1200" kern="1200" dirty="0" smtClean="0">
+                <a:solidFill>
+                  <a:schemeClr val="tx1"/>
+                </a:solidFill>
+                <a:latin typeface="Courier New" panose="02070309020205020404" pitchFamily="49" charset="0"/>
+                <a:ea typeface="+mn-ea"/>
+                <a:cs typeface="Courier New" panose="02070309020205020404" pitchFamily="49" charset="0"/>
+              </a:rPr>
+              <a:t>-- Getting lists of tables</a:t>
+            </a:r>
+          </a:p>
+          <a:p>
+            <a:r>
+              <a:rPr lang="en-US" sz="1200" kern="1200" dirty="0" smtClean="0">
+                <a:solidFill>
+                  <a:schemeClr val="tx1"/>
+                </a:solidFill>
+                <a:latin typeface="Courier New" panose="02070309020205020404" pitchFamily="49" charset="0"/>
+                <a:ea typeface="+mn-ea"/>
+                <a:cs typeface="Courier New" panose="02070309020205020404" pitchFamily="49" charset="0"/>
+              </a:rPr>
+              <a:t>select schemas.name, tables.name</a:t>
+            </a:r>
+          </a:p>
+          <a:p>
+            <a:r>
+              <a:rPr lang="en-US" sz="1200" kern="1200" dirty="0" smtClean="0">
+                <a:solidFill>
+                  <a:schemeClr val="tx1"/>
+                </a:solidFill>
+                <a:latin typeface="Courier New" panose="02070309020205020404" pitchFamily="49" charset="0"/>
+                <a:ea typeface="+mn-ea"/>
+                <a:cs typeface="Courier New" panose="02070309020205020404" pitchFamily="49" charset="0"/>
+              </a:rPr>
+              <a:t>  from AdventureWorks2014.sys.tables</a:t>
+            </a:r>
+          </a:p>
+          <a:p>
+            <a:r>
+              <a:rPr lang="en-US" sz="1200" kern="1200" dirty="0" smtClean="0">
+                <a:solidFill>
+                  <a:schemeClr val="tx1"/>
+                </a:solidFill>
+                <a:latin typeface="Courier New" panose="02070309020205020404" pitchFamily="49" charset="0"/>
+                <a:ea typeface="+mn-ea"/>
+                <a:cs typeface="Courier New" panose="02070309020205020404" pitchFamily="49" charset="0"/>
+              </a:rPr>
+              <a:t>  join AdventureWorks2014.sys.schemas on </a:t>
+            </a:r>
+            <a:r>
+              <a:rPr lang="en-US" sz="1200" kern="1200" dirty="0" err="1" smtClean="0">
+                <a:solidFill>
+                  <a:schemeClr val="tx1"/>
+                </a:solidFill>
+                <a:latin typeface="Courier New" panose="02070309020205020404" pitchFamily="49" charset="0"/>
+                <a:ea typeface="+mn-ea"/>
+                <a:cs typeface="Courier New" panose="02070309020205020404" pitchFamily="49" charset="0"/>
+              </a:rPr>
+              <a:t>schemas.schema_id</a:t>
+            </a:r>
+            <a:r>
+              <a:rPr lang="en-US" sz="1200" kern="1200" dirty="0" smtClean="0">
+                <a:solidFill>
+                  <a:schemeClr val="tx1"/>
+                </a:solidFill>
+                <a:latin typeface="Courier New" panose="02070309020205020404" pitchFamily="49" charset="0"/>
+                <a:ea typeface="+mn-ea"/>
+                <a:cs typeface="Courier New" panose="02070309020205020404" pitchFamily="49" charset="0"/>
+              </a:rPr>
+              <a:t>=</a:t>
+            </a:r>
+            <a:r>
+              <a:rPr lang="en-US" sz="1200" kern="1200" dirty="0" err="1" smtClean="0">
+                <a:solidFill>
+                  <a:schemeClr val="tx1"/>
+                </a:solidFill>
+                <a:latin typeface="Courier New" panose="02070309020205020404" pitchFamily="49" charset="0"/>
+                <a:ea typeface="+mn-ea"/>
+                <a:cs typeface="Courier New" panose="02070309020205020404" pitchFamily="49" charset="0"/>
+              </a:rPr>
+              <a:t>tables.schema_id</a:t>
+            </a:r>
+            <a:endParaRPr lang="en-US" sz="1200" kern="1200" dirty="0" smtClean="0">
+              <a:solidFill>
+                <a:schemeClr val="tx1"/>
+              </a:solidFill>
+              <a:latin typeface="Courier New" panose="02070309020205020404" pitchFamily="49" charset="0"/>
+              <a:ea typeface="+mn-ea"/>
+              <a:cs typeface="Courier New" panose="02070309020205020404" pitchFamily="49" charset="0"/>
+            </a:endParaRPr>
+          </a:p>
+          <a:p>
+            <a:r>
+              <a:rPr lang="en-US" sz="1200" kern="1200" dirty="0" smtClean="0">
+                <a:solidFill>
+                  <a:schemeClr val="tx1"/>
+                </a:solidFill>
+                <a:latin typeface="Courier New" panose="02070309020205020404" pitchFamily="49" charset="0"/>
+                <a:ea typeface="+mn-ea"/>
+                <a:cs typeface="Courier New" panose="02070309020205020404" pitchFamily="49" charset="0"/>
+              </a:rPr>
+              <a:t> where </a:t>
+            </a:r>
+            <a:r>
+              <a:rPr lang="en-US" sz="1200" kern="1200" dirty="0" err="1" smtClean="0">
+                <a:solidFill>
+                  <a:schemeClr val="tx1"/>
+                </a:solidFill>
+                <a:latin typeface="Courier New" panose="02070309020205020404" pitchFamily="49" charset="0"/>
+                <a:ea typeface="+mn-ea"/>
+                <a:cs typeface="Courier New" panose="02070309020205020404" pitchFamily="49" charset="0"/>
+              </a:rPr>
+              <a:t>tables.schema_id</a:t>
+            </a:r>
+            <a:r>
+              <a:rPr lang="en-US" sz="1200" kern="1200" dirty="0" smtClean="0">
+                <a:solidFill>
+                  <a:schemeClr val="tx1"/>
+                </a:solidFill>
+                <a:latin typeface="Courier New" panose="02070309020205020404" pitchFamily="49" charset="0"/>
+                <a:ea typeface="+mn-ea"/>
+                <a:cs typeface="Courier New" panose="02070309020205020404" pitchFamily="49" charset="0"/>
+              </a:rPr>
+              <a:t> &gt; 1</a:t>
+            </a:r>
+          </a:p>
+          <a:p>
+            <a:r>
+              <a:rPr lang="en-US" sz="1200" kern="1200" dirty="0" smtClean="0">
+                <a:solidFill>
+                  <a:schemeClr val="tx1"/>
+                </a:solidFill>
+                <a:latin typeface="Courier New" panose="02070309020205020404" pitchFamily="49" charset="0"/>
+                <a:ea typeface="+mn-ea"/>
+                <a:cs typeface="Courier New" panose="02070309020205020404" pitchFamily="49" charset="0"/>
+              </a:rPr>
+              <a:t> order by schemas.name, tables.name</a:t>
+            </a:r>
+          </a:p>
+          <a:p>
+            <a:endParaRPr lang="en-US" sz="1200" kern="1200" dirty="0" smtClean="0">
+              <a:solidFill>
+                <a:schemeClr val="tx1"/>
+              </a:solidFill>
+              <a:latin typeface="Courier New" panose="02070309020205020404" pitchFamily="49" charset="0"/>
+              <a:ea typeface="+mn-ea"/>
+              <a:cs typeface="Courier New" panose="02070309020205020404" pitchFamily="49" charset="0"/>
+            </a:endParaRPr>
+          </a:p>
+          <a:p>
+            <a:r>
+              <a:rPr lang="en-US" sz="1200" kern="1200" dirty="0" smtClean="0">
+                <a:solidFill>
+                  <a:schemeClr val="tx1"/>
+                </a:solidFill>
+                <a:latin typeface="Courier New" panose="02070309020205020404" pitchFamily="49" charset="0"/>
+                <a:ea typeface="+mn-ea"/>
+                <a:cs typeface="Courier New" panose="02070309020205020404" pitchFamily="49" charset="0"/>
+              </a:rPr>
+              <a:t>select schemas.name, tables.name</a:t>
+            </a:r>
+          </a:p>
+          <a:p>
+            <a:r>
+              <a:rPr lang="en-US" sz="1200" kern="1200" dirty="0" smtClean="0">
+                <a:solidFill>
+                  <a:schemeClr val="tx1"/>
+                </a:solidFill>
+                <a:latin typeface="Courier New" panose="02070309020205020404" pitchFamily="49" charset="0"/>
+                <a:ea typeface="+mn-ea"/>
+                <a:cs typeface="Courier New" panose="02070309020205020404" pitchFamily="49" charset="0"/>
+              </a:rPr>
+              <a:t>  from </a:t>
+            </a:r>
+            <a:r>
+              <a:rPr lang="en-US" sz="1200" kern="1200" dirty="0" err="1" smtClean="0">
+                <a:solidFill>
+                  <a:schemeClr val="tx1"/>
+                </a:solidFill>
+                <a:latin typeface="Courier New" panose="02070309020205020404" pitchFamily="49" charset="0"/>
+                <a:ea typeface="+mn-ea"/>
+                <a:cs typeface="Courier New" panose="02070309020205020404" pitchFamily="49" charset="0"/>
+              </a:rPr>
+              <a:t>AdventureWorksDW.sys.tables</a:t>
+            </a:r>
+            <a:endParaRPr lang="en-US" sz="1200" kern="1200" dirty="0" smtClean="0">
+              <a:solidFill>
+                <a:schemeClr val="tx1"/>
+              </a:solidFill>
+              <a:latin typeface="Courier New" panose="02070309020205020404" pitchFamily="49" charset="0"/>
+              <a:ea typeface="+mn-ea"/>
+              <a:cs typeface="Courier New" panose="02070309020205020404" pitchFamily="49" charset="0"/>
+            </a:endParaRPr>
+          </a:p>
+          <a:p>
+            <a:r>
+              <a:rPr lang="en-US" sz="1200" kern="1200" dirty="0" smtClean="0">
+                <a:solidFill>
+                  <a:schemeClr val="tx1"/>
+                </a:solidFill>
+                <a:latin typeface="Courier New" panose="02070309020205020404" pitchFamily="49" charset="0"/>
+                <a:ea typeface="+mn-ea"/>
+                <a:cs typeface="Courier New" panose="02070309020205020404" pitchFamily="49" charset="0"/>
+              </a:rPr>
+              <a:t>  join </a:t>
+            </a:r>
+            <a:r>
+              <a:rPr lang="en-US" sz="1200" kern="1200" dirty="0" err="1" smtClean="0">
+                <a:solidFill>
+                  <a:schemeClr val="tx1"/>
+                </a:solidFill>
+                <a:latin typeface="Courier New" panose="02070309020205020404" pitchFamily="49" charset="0"/>
+                <a:ea typeface="+mn-ea"/>
+                <a:cs typeface="Courier New" panose="02070309020205020404" pitchFamily="49" charset="0"/>
+              </a:rPr>
+              <a:t>AdventureWorksDW.sys.schemas</a:t>
+            </a:r>
+            <a:r>
+              <a:rPr lang="en-US" sz="1200" kern="1200" dirty="0" smtClean="0">
+                <a:solidFill>
+                  <a:schemeClr val="tx1"/>
+                </a:solidFill>
+                <a:latin typeface="Courier New" panose="02070309020205020404" pitchFamily="49" charset="0"/>
+                <a:ea typeface="+mn-ea"/>
+                <a:cs typeface="Courier New" panose="02070309020205020404" pitchFamily="49" charset="0"/>
+              </a:rPr>
+              <a:t> on </a:t>
+            </a:r>
+            <a:r>
+              <a:rPr lang="en-US" sz="1200" kern="1200" dirty="0" err="1" smtClean="0">
+                <a:solidFill>
+                  <a:schemeClr val="tx1"/>
+                </a:solidFill>
+                <a:latin typeface="Courier New" panose="02070309020205020404" pitchFamily="49" charset="0"/>
+                <a:ea typeface="+mn-ea"/>
+                <a:cs typeface="Courier New" panose="02070309020205020404" pitchFamily="49" charset="0"/>
+              </a:rPr>
+              <a:t>schemas.schema_id</a:t>
+            </a:r>
+            <a:r>
+              <a:rPr lang="en-US" sz="1200" kern="1200" dirty="0" smtClean="0">
+                <a:solidFill>
+                  <a:schemeClr val="tx1"/>
+                </a:solidFill>
+                <a:latin typeface="Courier New" panose="02070309020205020404" pitchFamily="49" charset="0"/>
+                <a:ea typeface="+mn-ea"/>
+                <a:cs typeface="Courier New" panose="02070309020205020404" pitchFamily="49" charset="0"/>
+              </a:rPr>
+              <a:t>=</a:t>
+            </a:r>
+            <a:r>
+              <a:rPr lang="en-US" sz="1200" kern="1200" dirty="0" err="1" smtClean="0">
+                <a:solidFill>
+                  <a:schemeClr val="tx1"/>
+                </a:solidFill>
+                <a:latin typeface="Courier New" panose="02070309020205020404" pitchFamily="49" charset="0"/>
+                <a:ea typeface="+mn-ea"/>
+                <a:cs typeface="Courier New" panose="02070309020205020404" pitchFamily="49" charset="0"/>
+              </a:rPr>
+              <a:t>tables.schema_id</a:t>
+            </a:r>
+            <a:endParaRPr lang="en-US" sz="1200" kern="1200" dirty="0" smtClean="0">
+              <a:solidFill>
+                <a:schemeClr val="tx1"/>
+              </a:solidFill>
+              <a:latin typeface="Courier New" panose="02070309020205020404" pitchFamily="49" charset="0"/>
+              <a:ea typeface="+mn-ea"/>
+              <a:cs typeface="Courier New" panose="02070309020205020404" pitchFamily="49" charset="0"/>
+            </a:endParaRPr>
+          </a:p>
+          <a:p>
+            <a:r>
+              <a:rPr lang="en-US" sz="1200" kern="1200" dirty="0" smtClean="0">
+                <a:solidFill>
+                  <a:schemeClr val="tx1"/>
+                </a:solidFill>
+                <a:latin typeface="Courier New" panose="02070309020205020404" pitchFamily="49" charset="0"/>
+                <a:ea typeface="+mn-ea"/>
+                <a:cs typeface="Courier New" panose="02070309020205020404" pitchFamily="49" charset="0"/>
+              </a:rPr>
+              <a:t> order by schemas.name, tables.name</a:t>
+            </a:r>
+          </a:p>
+          <a:p>
+            <a:endParaRPr lang="en-US" sz="1200" kern="1200" dirty="0" smtClean="0">
+              <a:solidFill>
+                <a:schemeClr val="tx1"/>
+              </a:solidFill>
+              <a:latin typeface="Courier New" panose="02070309020205020404" pitchFamily="49" charset="0"/>
+              <a:ea typeface="+mn-ea"/>
+              <a:cs typeface="Courier New" panose="02070309020205020404" pitchFamily="49" charset="0"/>
+            </a:endParaRPr>
+          </a:p>
+          <a:p>
+            <a:r>
+              <a:rPr lang="en-US" sz="1200" kern="1200" dirty="0" smtClean="0">
+                <a:solidFill>
+                  <a:schemeClr val="tx1"/>
+                </a:solidFill>
+                <a:latin typeface="Courier New" panose="02070309020205020404" pitchFamily="49" charset="0"/>
+                <a:ea typeface="+mn-ea"/>
+                <a:cs typeface="Courier New" panose="02070309020205020404" pitchFamily="49" charset="0"/>
+              </a:rPr>
+              <a:t>-- Analyze table designs - start with Dim tables</a:t>
+            </a:r>
+          </a:p>
+          <a:p>
+            <a:r>
+              <a:rPr lang="en-US" sz="1200" kern="1200" dirty="0" smtClean="0">
+                <a:solidFill>
+                  <a:schemeClr val="tx1"/>
+                </a:solidFill>
+                <a:latin typeface="Courier New" panose="02070309020205020404" pitchFamily="49" charset="0"/>
+                <a:ea typeface="+mn-ea"/>
+                <a:cs typeface="Courier New" panose="02070309020205020404" pitchFamily="49" charset="0"/>
+              </a:rPr>
+              <a:t>SELECT *</a:t>
+            </a:r>
+          </a:p>
+          <a:p>
+            <a:r>
+              <a:rPr lang="en-US" sz="1200" kern="1200" dirty="0" smtClean="0">
+                <a:solidFill>
+                  <a:schemeClr val="tx1"/>
+                </a:solidFill>
+                <a:latin typeface="Courier New" panose="02070309020205020404" pitchFamily="49" charset="0"/>
+                <a:ea typeface="+mn-ea"/>
+                <a:cs typeface="Courier New" panose="02070309020205020404" pitchFamily="49" charset="0"/>
+              </a:rPr>
+              <a:t>FROM [</a:t>
+            </a:r>
+            <a:r>
+              <a:rPr lang="en-US" sz="1200" kern="1200" dirty="0" err="1" smtClean="0">
+                <a:solidFill>
+                  <a:schemeClr val="tx1"/>
+                </a:solidFill>
+                <a:latin typeface="Courier New" panose="02070309020205020404" pitchFamily="49" charset="0"/>
+                <a:ea typeface="+mn-ea"/>
+                <a:cs typeface="Courier New" panose="02070309020205020404" pitchFamily="49" charset="0"/>
+              </a:rPr>
+              <a:t>dbo</a:t>
+            </a:r>
+            <a:r>
+              <a:rPr lang="en-US" sz="1200" kern="1200" dirty="0" smtClean="0">
+                <a:solidFill>
+                  <a:schemeClr val="tx1"/>
+                </a:solidFill>
+                <a:latin typeface="Courier New" panose="02070309020205020404" pitchFamily="49" charset="0"/>
+                <a:ea typeface="+mn-ea"/>
+                <a:cs typeface="Courier New" panose="02070309020205020404" pitchFamily="49" charset="0"/>
+              </a:rPr>
+              <a:t>].[</a:t>
+            </a:r>
+            <a:r>
+              <a:rPr lang="en-US" sz="1200" kern="1200" dirty="0" err="1" smtClean="0">
+                <a:solidFill>
+                  <a:schemeClr val="tx1"/>
+                </a:solidFill>
+                <a:latin typeface="Courier New" panose="02070309020205020404" pitchFamily="49" charset="0"/>
+                <a:ea typeface="+mn-ea"/>
+                <a:cs typeface="Courier New" panose="02070309020205020404" pitchFamily="49" charset="0"/>
+              </a:rPr>
+              <a:t>DimProductCategory</a:t>
+            </a:r>
+            <a:r>
+              <a:rPr lang="en-US" sz="1200" kern="1200" dirty="0" smtClean="0">
+                <a:solidFill>
+                  <a:schemeClr val="tx1"/>
+                </a:solidFill>
+                <a:latin typeface="Courier New" panose="02070309020205020404" pitchFamily="49" charset="0"/>
+                <a:ea typeface="+mn-ea"/>
+                <a:cs typeface="Courier New" panose="02070309020205020404" pitchFamily="49" charset="0"/>
+              </a:rPr>
+              <a:t>]</a:t>
+            </a:r>
+          </a:p>
+          <a:p>
+            <a:r>
+              <a:rPr lang="en-US" sz="1200" kern="1200" dirty="0" smtClean="0">
+                <a:solidFill>
+                  <a:schemeClr val="tx1"/>
+                </a:solidFill>
+                <a:latin typeface="Courier New" panose="02070309020205020404" pitchFamily="49" charset="0"/>
+                <a:ea typeface="+mn-ea"/>
+                <a:cs typeface="Courier New" panose="02070309020205020404" pitchFamily="49" charset="0"/>
+              </a:rPr>
+              <a:t>OPTION (LABEL = 'BSW </a:t>
+            </a:r>
+            <a:r>
+              <a:rPr lang="en-US" sz="1200" kern="1200" dirty="0" err="1" smtClean="0">
+                <a:solidFill>
+                  <a:schemeClr val="tx1"/>
+                </a:solidFill>
+                <a:latin typeface="Courier New" panose="02070309020205020404" pitchFamily="49" charset="0"/>
+                <a:ea typeface="+mn-ea"/>
+                <a:cs typeface="Courier New" panose="02070309020205020404" pitchFamily="49" charset="0"/>
+              </a:rPr>
+              <a:t>Qry</a:t>
+            </a:r>
+            <a:r>
+              <a:rPr lang="en-US" sz="1200" kern="1200" dirty="0" smtClean="0">
+                <a:solidFill>
+                  <a:schemeClr val="tx1"/>
+                </a:solidFill>
+                <a:latin typeface="Courier New" panose="02070309020205020404" pitchFamily="49" charset="0"/>
+                <a:ea typeface="+mn-ea"/>
+                <a:cs typeface="Courier New" panose="02070309020205020404" pitchFamily="49" charset="0"/>
+              </a:rPr>
+              <a:t> </a:t>
+            </a:r>
+            <a:r>
+              <a:rPr lang="en-US" sz="1200" kern="1200" dirty="0" err="1" smtClean="0">
+                <a:solidFill>
+                  <a:schemeClr val="tx1"/>
+                </a:solidFill>
+                <a:latin typeface="Courier New" panose="02070309020205020404" pitchFamily="49" charset="0"/>
+                <a:ea typeface="+mn-ea"/>
+                <a:cs typeface="Courier New" panose="02070309020205020404" pitchFamily="49" charset="0"/>
+              </a:rPr>
+              <a:t>ProductCategory</a:t>
+            </a:r>
+            <a:r>
+              <a:rPr lang="en-US" sz="1200" kern="1200" dirty="0" smtClean="0">
+                <a:solidFill>
+                  <a:schemeClr val="tx1"/>
+                </a:solidFill>
+                <a:latin typeface="Courier New" panose="02070309020205020404" pitchFamily="49" charset="0"/>
+                <a:ea typeface="+mn-ea"/>
+                <a:cs typeface="Courier New" panose="02070309020205020404" pitchFamily="49" charset="0"/>
+              </a:rPr>
+              <a:t>')</a:t>
+            </a:r>
+          </a:p>
+          <a:p>
+            <a:endParaRPr lang="en-US" sz="1200" kern="1200" dirty="0" smtClean="0">
+              <a:solidFill>
+                <a:schemeClr val="tx1"/>
+              </a:solidFill>
+              <a:latin typeface="Courier New" panose="02070309020205020404" pitchFamily="49" charset="0"/>
+              <a:ea typeface="+mn-ea"/>
+              <a:cs typeface="Courier New" panose="02070309020205020404" pitchFamily="49" charset="0"/>
+            </a:endParaRPr>
+          </a:p>
+          <a:p>
+            <a:r>
+              <a:rPr lang="en-US" sz="1200" kern="1200" dirty="0" smtClean="0">
+                <a:solidFill>
+                  <a:schemeClr val="tx1"/>
+                </a:solidFill>
+                <a:latin typeface="Courier New" panose="02070309020205020404" pitchFamily="49" charset="0"/>
+                <a:ea typeface="+mn-ea"/>
+                <a:cs typeface="Courier New" panose="02070309020205020404" pitchFamily="49" charset="0"/>
+              </a:rPr>
+              <a:t>SELECT *</a:t>
+            </a:r>
+          </a:p>
+          <a:p>
+            <a:r>
+              <a:rPr lang="en-US" sz="1200" kern="1200" dirty="0" smtClean="0">
+                <a:solidFill>
+                  <a:schemeClr val="tx1"/>
+                </a:solidFill>
+                <a:latin typeface="Courier New" panose="02070309020205020404" pitchFamily="49" charset="0"/>
+                <a:ea typeface="+mn-ea"/>
+                <a:cs typeface="Courier New" panose="02070309020205020404" pitchFamily="49" charset="0"/>
+              </a:rPr>
+              <a:t>FROM [</a:t>
+            </a:r>
+            <a:r>
+              <a:rPr lang="en-US" sz="1200" kern="1200" dirty="0" err="1" smtClean="0">
+                <a:solidFill>
+                  <a:schemeClr val="tx1"/>
+                </a:solidFill>
+                <a:latin typeface="Courier New" panose="02070309020205020404" pitchFamily="49" charset="0"/>
+                <a:ea typeface="+mn-ea"/>
+                <a:cs typeface="Courier New" panose="02070309020205020404" pitchFamily="49" charset="0"/>
+              </a:rPr>
+              <a:t>dbo</a:t>
+            </a:r>
+            <a:r>
+              <a:rPr lang="en-US" sz="1200" kern="1200" dirty="0" smtClean="0">
+                <a:solidFill>
+                  <a:schemeClr val="tx1"/>
+                </a:solidFill>
+                <a:latin typeface="Courier New" panose="02070309020205020404" pitchFamily="49" charset="0"/>
+                <a:ea typeface="+mn-ea"/>
+                <a:cs typeface="Courier New" panose="02070309020205020404" pitchFamily="49" charset="0"/>
+              </a:rPr>
+              <a:t>].[</a:t>
+            </a:r>
+            <a:r>
+              <a:rPr lang="en-US" sz="1200" kern="1200" dirty="0" err="1" smtClean="0">
+                <a:solidFill>
+                  <a:schemeClr val="tx1"/>
+                </a:solidFill>
+                <a:latin typeface="Courier New" panose="02070309020205020404" pitchFamily="49" charset="0"/>
+                <a:ea typeface="+mn-ea"/>
+                <a:cs typeface="Courier New" panose="02070309020205020404" pitchFamily="49" charset="0"/>
+              </a:rPr>
+              <a:t>DimProductSubCategory</a:t>
+            </a:r>
+            <a:r>
+              <a:rPr lang="en-US" sz="1200" kern="1200" dirty="0" smtClean="0">
+                <a:solidFill>
+                  <a:schemeClr val="tx1"/>
+                </a:solidFill>
+                <a:latin typeface="Courier New" panose="02070309020205020404" pitchFamily="49" charset="0"/>
+                <a:ea typeface="+mn-ea"/>
+                <a:cs typeface="Courier New" panose="02070309020205020404" pitchFamily="49" charset="0"/>
+              </a:rPr>
+              <a:t>]</a:t>
+            </a:r>
+          </a:p>
+          <a:p>
+            <a:r>
+              <a:rPr lang="en-US" sz="1200" kern="1200" dirty="0" smtClean="0">
+                <a:solidFill>
+                  <a:schemeClr val="tx1"/>
+                </a:solidFill>
+                <a:latin typeface="Courier New" panose="02070309020205020404" pitchFamily="49" charset="0"/>
+                <a:ea typeface="+mn-ea"/>
+                <a:cs typeface="Courier New" panose="02070309020205020404" pitchFamily="49" charset="0"/>
+              </a:rPr>
+              <a:t>OPTION (LABEL = 'BSW </a:t>
+            </a:r>
+            <a:r>
+              <a:rPr lang="en-US" sz="1200" kern="1200" dirty="0" err="1" smtClean="0">
+                <a:solidFill>
+                  <a:schemeClr val="tx1"/>
+                </a:solidFill>
+                <a:latin typeface="Courier New" panose="02070309020205020404" pitchFamily="49" charset="0"/>
+                <a:ea typeface="+mn-ea"/>
+                <a:cs typeface="Courier New" panose="02070309020205020404" pitchFamily="49" charset="0"/>
+              </a:rPr>
+              <a:t>Qry</a:t>
+            </a:r>
+            <a:r>
+              <a:rPr lang="en-US" sz="1200" kern="1200" dirty="0" smtClean="0">
+                <a:solidFill>
+                  <a:schemeClr val="tx1"/>
+                </a:solidFill>
+                <a:latin typeface="Courier New" panose="02070309020205020404" pitchFamily="49" charset="0"/>
+                <a:ea typeface="+mn-ea"/>
+                <a:cs typeface="Courier New" panose="02070309020205020404" pitchFamily="49" charset="0"/>
+              </a:rPr>
+              <a:t> </a:t>
+            </a:r>
+            <a:r>
+              <a:rPr lang="en-US" sz="1200" kern="1200" dirty="0" err="1" smtClean="0">
+                <a:solidFill>
+                  <a:schemeClr val="tx1"/>
+                </a:solidFill>
+                <a:latin typeface="Courier New" panose="02070309020205020404" pitchFamily="49" charset="0"/>
+                <a:ea typeface="+mn-ea"/>
+                <a:cs typeface="Courier New" panose="02070309020205020404" pitchFamily="49" charset="0"/>
+              </a:rPr>
+              <a:t>ProductSubCategory</a:t>
+            </a:r>
+            <a:r>
+              <a:rPr lang="en-US" sz="1200" kern="1200" dirty="0" smtClean="0">
+                <a:solidFill>
+                  <a:schemeClr val="tx1"/>
+                </a:solidFill>
+                <a:latin typeface="Courier New" panose="02070309020205020404" pitchFamily="49" charset="0"/>
+                <a:ea typeface="+mn-ea"/>
+                <a:cs typeface="Courier New" panose="02070309020205020404" pitchFamily="49" charset="0"/>
+              </a:rPr>
+              <a:t>')</a:t>
+            </a:r>
+          </a:p>
+          <a:p>
+            <a:endParaRPr lang="en-US" sz="1200" kern="1200" dirty="0" smtClean="0">
+              <a:solidFill>
+                <a:schemeClr val="tx1"/>
+              </a:solidFill>
+              <a:latin typeface="Courier New" panose="02070309020205020404" pitchFamily="49" charset="0"/>
+              <a:ea typeface="+mn-ea"/>
+              <a:cs typeface="Courier New" panose="02070309020205020404" pitchFamily="49" charset="0"/>
+            </a:endParaRPr>
+          </a:p>
+          <a:p>
+            <a:r>
+              <a:rPr lang="en-US" sz="1200" kern="1200" dirty="0" smtClean="0">
+                <a:solidFill>
+                  <a:schemeClr val="tx1"/>
+                </a:solidFill>
+                <a:latin typeface="Courier New" panose="02070309020205020404" pitchFamily="49" charset="0"/>
+                <a:ea typeface="+mn-ea"/>
+                <a:cs typeface="Courier New" panose="02070309020205020404" pitchFamily="49" charset="0"/>
+              </a:rPr>
+              <a:t>SELECT *</a:t>
+            </a:r>
+          </a:p>
+          <a:p>
+            <a:r>
+              <a:rPr lang="en-US" sz="1200" kern="1200" dirty="0" smtClean="0">
+                <a:solidFill>
+                  <a:schemeClr val="tx1"/>
+                </a:solidFill>
+                <a:latin typeface="Courier New" panose="02070309020205020404" pitchFamily="49" charset="0"/>
+                <a:ea typeface="+mn-ea"/>
+                <a:cs typeface="Courier New" panose="02070309020205020404" pitchFamily="49" charset="0"/>
+              </a:rPr>
+              <a:t>FROM [</a:t>
+            </a:r>
+            <a:r>
+              <a:rPr lang="en-US" sz="1200" kern="1200" dirty="0" err="1" smtClean="0">
+                <a:solidFill>
+                  <a:schemeClr val="tx1"/>
+                </a:solidFill>
+                <a:latin typeface="Courier New" panose="02070309020205020404" pitchFamily="49" charset="0"/>
+                <a:ea typeface="+mn-ea"/>
+                <a:cs typeface="Courier New" panose="02070309020205020404" pitchFamily="49" charset="0"/>
+              </a:rPr>
+              <a:t>dbo</a:t>
+            </a:r>
+            <a:r>
+              <a:rPr lang="en-US" sz="1200" kern="1200" dirty="0" smtClean="0">
+                <a:solidFill>
+                  <a:schemeClr val="tx1"/>
+                </a:solidFill>
+                <a:latin typeface="Courier New" panose="02070309020205020404" pitchFamily="49" charset="0"/>
+                <a:ea typeface="+mn-ea"/>
+                <a:cs typeface="Courier New" panose="02070309020205020404" pitchFamily="49" charset="0"/>
+              </a:rPr>
+              <a:t>].[</a:t>
+            </a:r>
+            <a:r>
+              <a:rPr lang="en-US" sz="1200" kern="1200" dirty="0" err="1" smtClean="0">
+                <a:solidFill>
+                  <a:schemeClr val="tx1"/>
+                </a:solidFill>
+                <a:latin typeface="Courier New" panose="02070309020205020404" pitchFamily="49" charset="0"/>
+                <a:ea typeface="+mn-ea"/>
+                <a:cs typeface="Courier New" panose="02070309020205020404" pitchFamily="49" charset="0"/>
+              </a:rPr>
+              <a:t>DimProduct</a:t>
+            </a:r>
+            <a:r>
+              <a:rPr lang="en-US" sz="1200" kern="1200" dirty="0" smtClean="0">
+                <a:solidFill>
+                  <a:schemeClr val="tx1"/>
+                </a:solidFill>
+                <a:latin typeface="Courier New" panose="02070309020205020404" pitchFamily="49" charset="0"/>
+                <a:ea typeface="+mn-ea"/>
+                <a:cs typeface="Courier New" panose="02070309020205020404" pitchFamily="49" charset="0"/>
+              </a:rPr>
+              <a:t>]</a:t>
+            </a:r>
+          </a:p>
+          <a:p>
+            <a:r>
+              <a:rPr lang="en-US" sz="1200" kern="1200" dirty="0" smtClean="0">
+                <a:solidFill>
+                  <a:schemeClr val="tx1"/>
+                </a:solidFill>
+                <a:latin typeface="Courier New" panose="02070309020205020404" pitchFamily="49" charset="0"/>
+                <a:ea typeface="+mn-ea"/>
+                <a:cs typeface="Courier New" panose="02070309020205020404" pitchFamily="49" charset="0"/>
+              </a:rPr>
+              <a:t>OPTION (LABEL = 'BSW </a:t>
+            </a:r>
+            <a:r>
+              <a:rPr lang="en-US" sz="1200" kern="1200" dirty="0" err="1" smtClean="0">
+                <a:solidFill>
+                  <a:schemeClr val="tx1"/>
+                </a:solidFill>
+                <a:latin typeface="Courier New" panose="02070309020205020404" pitchFamily="49" charset="0"/>
+                <a:ea typeface="+mn-ea"/>
+                <a:cs typeface="Courier New" panose="02070309020205020404" pitchFamily="49" charset="0"/>
+              </a:rPr>
+              <a:t>Qry</a:t>
+            </a:r>
+            <a:r>
+              <a:rPr lang="en-US" sz="1200" kern="1200" dirty="0" smtClean="0">
+                <a:solidFill>
+                  <a:schemeClr val="tx1"/>
+                </a:solidFill>
+                <a:latin typeface="Courier New" panose="02070309020205020404" pitchFamily="49" charset="0"/>
+                <a:ea typeface="+mn-ea"/>
+                <a:cs typeface="Courier New" panose="02070309020205020404" pitchFamily="49" charset="0"/>
+              </a:rPr>
+              <a:t> Product')</a:t>
+            </a:r>
+          </a:p>
+          <a:p>
+            <a:endParaRPr lang="en-US" sz="1200" kern="1200" dirty="0" smtClean="0">
+              <a:solidFill>
+                <a:schemeClr val="tx1"/>
+              </a:solidFill>
+              <a:latin typeface="Courier New" panose="02070309020205020404" pitchFamily="49" charset="0"/>
+              <a:ea typeface="+mn-ea"/>
+              <a:cs typeface="Courier New" panose="02070309020205020404" pitchFamily="49" charset="0"/>
+            </a:endParaRPr>
+          </a:p>
+          <a:p>
+            <a:r>
+              <a:rPr lang="en-US" sz="1200" kern="1200" dirty="0" smtClean="0">
+                <a:solidFill>
+                  <a:schemeClr val="tx1"/>
+                </a:solidFill>
+                <a:latin typeface="Courier New" panose="02070309020205020404" pitchFamily="49" charset="0"/>
+                <a:ea typeface="+mn-ea"/>
+                <a:cs typeface="Courier New" panose="02070309020205020404" pitchFamily="49" charset="0"/>
+              </a:rPr>
+              <a:t>-- Fact tables</a:t>
+            </a:r>
+          </a:p>
+          <a:p>
+            <a:r>
+              <a:rPr lang="en-US" sz="1200" kern="1200" dirty="0" smtClean="0">
+                <a:solidFill>
+                  <a:schemeClr val="tx1"/>
+                </a:solidFill>
+                <a:latin typeface="Courier New" panose="02070309020205020404" pitchFamily="49" charset="0"/>
+                <a:ea typeface="+mn-ea"/>
+                <a:cs typeface="Courier New" panose="02070309020205020404" pitchFamily="49" charset="0"/>
+              </a:rPr>
+              <a:t>SELECT  *</a:t>
+            </a:r>
+          </a:p>
+          <a:p>
+            <a:r>
+              <a:rPr lang="en-US" sz="1200" kern="1200" dirty="0" smtClean="0">
+                <a:solidFill>
+                  <a:schemeClr val="tx1"/>
+                </a:solidFill>
+                <a:latin typeface="Courier New" panose="02070309020205020404" pitchFamily="49" charset="0"/>
+                <a:ea typeface="+mn-ea"/>
+                <a:cs typeface="Courier New" panose="02070309020205020404" pitchFamily="49" charset="0"/>
+              </a:rPr>
+              <a:t>FROM [</a:t>
+            </a:r>
+            <a:r>
+              <a:rPr lang="en-US" sz="1200" kern="1200" dirty="0" err="1" smtClean="0">
+                <a:solidFill>
+                  <a:schemeClr val="tx1"/>
+                </a:solidFill>
+                <a:latin typeface="Courier New" panose="02070309020205020404" pitchFamily="49" charset="0"/>
+                <a:ea typeface="+mn-ea"/>
+                <a:cs typeface="Courier New" panose="02070309020205020404" pitchFamily="49" charset="0"/>
+              </a:rPr>
+              <a:t>dbo</a:t>
+            </a:r>
+            <a:r>
+              <a:rPr lang="en-US" sz="1200" kern="1200" dirty="0" smtClean="0">
+                <a:solidFill>
+                  <a:schemeClr val="tx1"/>
+                </a:solidFill>
+                <a:latin typeface="Courier New" panose="02070309020205020404" pitchFamily="49" charset="0"/>
+                <a:ea typeface="+mn-ea"/>
+                <a:cs typeface="Courier New" panose="02070309020205020404" pitchFamily="49" charset="0"/>
+              </a:rPr>
+              <a:t>].[</a:t>
+            </a:r>
+            <a:r>
+              <a:rPr lang="en-US" sz="1200" kern="1200" dirty="0" err="1" smtClean="0">
+                <a:solidFill>
+                  <a:schemeClr val="tx1"/>
+                </a:solidFill>
+                <a:latin typeface="Courier New" panose="02070309020205020404" pitchFamily="49" charset="0"/>
+                <a:ea typeface="+mn-ea"/>
+                <a:cs typeface="Courier New" panose="02070309020205020404" pitchFamily="49" charset="0"/>
+              </a:rPr>
+              <a:t>FactInternetSales</a:t>
+            </a:r>
+            <a:r>
+              <a:rPr lang="en-US" sz="1200" kern="1200" dirty="0" smtClean="0">
+                <a:solidFill>
+                  <a:schemeClr val="tx1"/>
+                </a:solidFill>
+                <a:latin typeface="Courier New" panose="02070309020205020404" pitchFamily="49" charset="0"/>
+                <a:ea typeface="+mn-ea"/>
+                <a:cs typeface="Courier New" panose="02070309020205020404" pitchFamily="49" charset="0"/>
+              </a:rPr>
+              <a:t>]</a:t>
+            </a:r>
+          </a:p>
+          <a:p>
+            <a:r>
+              <a:rPr lang="en-US" sz="1200" kern="1200" dirty="0" smtClean="0">
+                <a:solidFill>
+                  <a:schemeClr val="tx1"/>
+                </a:solidFill>
+                <a:latin typeface="Courier New" panose="02070309020205020404" pitchFamily="49" charset="0"/>
+                <a:ea typeface="+mn-ea"/>
+                <a:cs typeface="Courier New" panose="02070309020205020404" pitchFamily="49" charset="0"/>
+              </a:rPr>
+              <a:t>WHERE </a:t>
+            </a:r>
+            <a:r>
+              <a:rPr lang="en-US" sz="1200" kern="1200" dirty="0" err="1" smtClean="0">
+                <a:solidFill>
+                  <a:schemeClr val="tx1"/>
+                </a:solidFill>
+                <a:latin typeface="Courier New" panose="02070309020205020404" pitchFamily="49" charset="0"/>
+                <a:ea typeface="+mn-ea"/>
+                <a:cs typeface="Courier New" panose="02070309020205020404" pitchFamily="49" charset="0"/>
+              </a:rPr>
+              <a:t>SalesOrderNumber</a:t>
+            </a:r>
+            <a:r>
+              <a:rPr lang="en-US" sz="1200" kern="1200" dirty="0" smtClean="0">
+                <a:solidFill>
+                  <a:schemeClr val="tx1"/>
+                </a:solidFill>
+                <a:latin typeface="Courier New" panose="02070309020205020404" pitchFamily="49" charset="0"/>
+                <a:ea typeface="+mn-ea"/>
+                <a:cs typeface="Courier New" panose="02070309020205020404" pitchFamily="49" charset="0"/>
+              </a:rPr>
+              <a:t> IN ('SO43662','SO51212')</a:t>
+            </a:r>
+          </a:p>
+          <a:p>
+            <a:r>
+              <a:rPr lang="en-US" sz="1200" kern="1200" dirty="0" smtClean="0">
+                <a:solidFill>
+                  <a:schemeClr val="tx1"/>
+                </a:solidFill>
+                <a:latin typeface="Courier New" panose="02070309020205020404" pitchFamily="49" charset="0"/>
+                <a:ea typeface="+mn-ea"/>
+                <a:cs typeface="Courier New" panose="02070309020205020404" pitchFamily="49" charset="0"/>
+              </a:rPr>
+              <a:t>OPTION (LABEL = 'BSW </a:t>
+            </a:r>
+            <a:r>
+              <a:rPr lang="en-US" sz="1200" kern="1200" dirty="0" err="1" smtClean="0">
+                <a:solidFill>
+                  <a:schemeClr val="tx1"/>
+                </a:solidFill>
+                <a:latin typeface="Courier New" panose="02070309020205020404" pitchFamily="49" charset="0"/>
+                <a:ea typeface="+mn-ea"/>
+                <a:cs typeface="Courier New" panose="02070309020205020404" pitchFamily="49" charset="0"/>
+              </a:rPr>
+              <a:t>Qry</a:t>
+            </a:r>
+            <a:r>
+              <a:rPr lang="en-US" sz="1200" kern="1200" dirty="0" smtClean="0">
+                <a:solidFill>
+                  <a:schemeClr val="tx1"/>
+                </a:solidFill>
+                <a:latin typeface="Courier New" panose="02070309020205020404" pitchFamily="49" charset="0"/>
+                <a:ea typeface="+mn-ea"/>
+                <a:cs typeface="Courier New" panose="02070309020205020404" pitchFamily="49" charset="0"/>
+              </a:rPr>
+              <a:t> </a:t>
+            </a:r>
+            <a:r>
+              <a:rPr lang="en-US" sz="1200" kern="1200" dirty="0" err="1" smtClean="0">
+                <a:solidFill>
+                  <a:schemeClr val="tx1"/>
+                </a:solidFill>
+                <a:latin typeface="Courier New" panose="02070309020205020404" pitchFamily="49" charset="0"/>
+                <a:ea typeface="+mn-ea"/>
+                <a:cs typeface="Courier New" panose="02070309020205020404" pitchFamily="49" charset="0"/>
+              </a:rPr>
+              <a:t>InternetSales</a:t>
+            </a:r>
+            <a:r>
+              <a:rPr lang="en-US" sz="1200" kern="1200" dirty="0" smtClean="0">
+                <a:solidFill>
+                  <a:schemeClr val="tx1"/>
+                </a:solidFill>
+                <a:latin typeface="Courier New" panose="02070309020205020404" pitchFamily="49" charset="0"/>
+                <a:ea typeface="+mn-ea"/>
+                <a:cs typeface="Courier New" panose="02070309020205020404" pitchFamily="49" charset="0"/>
+              </a:rPr>
+              <a:t>')</a:t>
+            </a:r>
+          </a:p>
+          <a:p>
+            <a:endParaRPr lang="en-US" sz="1200" kern="1200" dirty="0" smtClean="0">
+              <a:solidFill>
+                <a:schemeClr val="tx1"/>
+              </a:solidFill>
+              <a:latin typeface="Courier New" panose="02070309020205020404" pitchFamily="49" charset="0"/>
+              <a:ea typeface="+mn-ea"/>
+              <a:cs typeface="Courier New" panose="02070309020205020404" pitchFamily="49" charset="0"/>
+            </a:endParaRPr>
+          </a:p>
+          <a:p>
+            <a:r>
+              <a:rPr lang="en-US" sz="1200" kern="1200" dirty="0" smtClean="0">
+                <a:solidFill>
+                  <a:schemeClr val="tx1"/>
+                </a:solidFill>
+                <a:latin typeface="Courier New" panose="02070309020205020404" pitchFamily="49" charset="0"/>
+                <a:ea typeface="+mn-ea"/>
+                <a:cs typeface="Courier New" panose="02070309020205020404" pitchFamily="49" charset="0"/>
+              </a:rPr>
+              <a:t>SELECT TOP 100 *</a:t>
+            </a:r>
+          </a:p>
+          <a:p>
+            <a:r>
+              <a:rPr lang="en-US" sz="1200" kern="1200" dirty="0" smtClean="0">
+                <a:solidFill>
+                  <a:schemeClr val="tx1"/>
+                </a:solidFill>
+                <a:latin typeface="Courier New" panose="02070309020205020404" pitchFamily="49" charset="0"/>
+                <a:ea typeface="+mn-ea"/>
+                <a:cs typeface="Courier New" panose="02070309020205020404" pitchFamily="49" charset="0"/>
+              </a:rPr>
+              <a:t>FROM [</a:t>
+            </a:r>
+            <a:r>
+              <a:rPr lang="en-US" sz="1200" kern="1200" dirty="0" err="1" smtClean="0">
+                <a:solidFill>
+                  <a:schemeClr val="tx1"/>
+                </a:solidFill>
+                <a:latin typeface="Courier New" panose="02070309020205020404" pitchFamily="49" charset="0"/>
+                <a:ea typeface="+mn-ea"/>
+                <a:cs typeface="Courier New" panose="02070309020205020404" pitchFamily="49" charset="0"/>
+              </a:rPr>
+              <a:t>dbo</a:t>
+            </a:r>
+            <a:r>
+              <a:rPr lang="en-US" sz="1200" kern="1200" dirty="0" smtClean="0">
+                <a:solidFill>
+                  <a:schemeClr val="tx1"/>
+                </a:solidFill>
+                <a:latin typeface="Courier New" panose="02070309020205020404" pitchFamily="49" charset="0"/>
+                <a:ea typeface="+mn-ea"/>
+                <a:cs typeface="Courier New" panose="02070309020205020404" pitchFamily="49" charset="0"/>
+              </a:rPr>
+              <a:t>].[</a:t>
+            </a:r>
+            <a:r>
+              <a:rPr lang="en-US" sz="1200" kern="1200" dirty="0" err="1" smtClean="0">
+                <a:solidFill>
+                  <a:schemeClr val="tx1"/>
+                </a:solidFill>
+                <a:latin typeface="Courier New" panose="02070309020205020404" pitchFamily="49" charset="0"/>
+                <a:ea typeface="+mn-ea"/>
+                <a:cs typeface="Courier New" panose="02070309020205020404" pitchFamily="49" charset="0"/>
+              </a:rPr>
+              <a:t>FactResellerSales</a:t>
+            </a:r>
+            <a:r>
+              <a:rPr lang="en-US" sz="1200" kern="1200" dirty="0" smtClean="0">
+                <a:solidFill>
+                  <a:schemeClr val="tx1"/>
+                </a:solidFill>
+                <a:latin typeface="Courier New" panose="02070309020205020404" pitchFamily="49" charset="0"/>
+                <a:ea typeface="+mn-ea"/>
+                <a:cs typeface="Courier New" panose="02070309020205020404" pitchFamily="49" charset="0"/>
+              </a:rPr>
+              <a:t>]</a:t>
+            </a:r>
+          </a:p>
+          <a:p>
+            <a:r>
+              <a:rPr lang="en-US" sz="1200" kern="1200" dirty="0" smtClean="0">
+                <a:solidFill>
+                  <a:schemeClr val="tx1"/>
+                </a:solidFill>
+                <a:latin typeface="Courier New" panose="02070309020205020404" pitchFamily="49" charset="0"/>
+                <a:ea typeface="+mn-ea"/>
+                <a:cs typeface="Courier New" panose="02070309020205020404" pitchFamily="49" charset="0"/>
+              </a:rPr>
+              <a:t>WHERE </a:t>
+            </a:r>
+            <a:r>
+              <a:rPr lang="en-US" sz="1200" kern="1200" dirty="0" err="1" smtClean="0">
+                <a:solidFill>
+                  <a:schemeClr val="tx1"/>
+                </a:solidFill>
+                <a:latin typeface="Courier New" panose="02070309020205020404" pitchFamily="49" charset="0"/>
+                <a:ea typeface="+mn-ea"/>
+                <a:cs typeface="Courier New" panose="02070309020205020404" pitchFamily="49" charset="0"/>
+              </a:rPr>
+              <a:t>SalesOrderNumber</a:t>
+            </a:r>
+            <a:r>
+              <a:rPr lang="en-US" sz="1200" kern="1200" dirty="0" smtClean="0">
+                <a:solidFill>
+                  <a:schemeClr val="tx1"/>
+                </a:solidFill>
+                <a:latin typeface="Courier New" panose="02070309020205020404" pitchFamily="49" charset="0"/>
+                <a:ea typeface="+mn-ea"/>
+                <a:cs typeface="Courier New" panose="02070309020205020404" pitchFamily="49" charset="0"/>
+              </a:rPr>
+              <a:t> IN ('SO43662','SO51212')</a:t>
+            </a:r>
+          </a:p>
+          <a:p>
+            <a:r>
+              <a:rPr lang="en-US" sz="1200" kern="1200" dirty="0" smtClean="0">
+                <a:solidFill>
+                  <a:schemeClr val="tx1"/>
+                </a:solidFill>
+                <a:latin typeface="Courier New" panose="02070309020205020404" pitchFamily="49" charset="0"/>
+                <a:ea typeface="+mn-ea"/>
+                <a:cs typeface="Courier New" panose="02070309020205020404" pitchFamily="49" charset="0"/>
+              </a:rPr>
+              <a:t>OPTION (LABEL = 'BSW </a:t>
+            </a:r>
+            <a:r>
+              <a:rPr lang="en-US" sz="1200" kern="1200" dirty="0" err="1" smtClean="0">
+                <a:solidFill>
+                  <a:schemeClr val="tx1"/>
+                </a:solidFill>
+                <a:latin typeface="Courier New" panose="02070309020205020404" pitchFamily="49" charset="0"/>
+                <a:ea typeface="+mn-ea"/>
+                <a:cs typeface="Courier New" panose="02070309020205020404" pitchFamily="49" charset="0"/>
+              </a:rPr>
+              <a:t>Qry</a:t>
+            </a:r>
+            <a:r>
+              <a:rPr lang="en-US" sz="1200" kern="1200" dirty="0" smtClean="0">
+                <a:solidFill>
+                  <a:schemeClr val="tx1"/>
+                </a:solidFill>
+                <a:latin typeface="Courier New" panose="02070309020205020404" pitchFamily="49" charset="0"/>
+                <a:ea typeface="+mn-ea"/>
+                <a:cs typeface="Courier New" panose="02070309020205020404" pitchFamily="49" charset="0"/>
+              </a:rPr>
+              <a:t> </a:t>
+            </a:r>
+            <a:r>
+              <a:rPr lang="en-US" sz="1200" kern="1200" dirty="0" err="1" smtClean="0">
+                <a:solidFill>
+                  <a:schemeClr val="tx1"/>
+                </a:solidFill>
+                <a:latin typeface="Courier New" panose="02070309020205020404" pitchFamily="49" charset="0"/>
+                <a:ea typeface="+mn-ea"/>
+                <a:cs typeface="Courier New" panose="02070309020205020404" pitchFamily="49" charset="0"/>
+              </a:rPr>
+              <a:t>ResellerSales</a:t>
+            </a:r>
+            <a:r>
+              <a:rPr lang="en-US" sz="1200" kern="1200" dirty="0" smtClean="0">
+                <a:solidFill>
+                  <a:schemeClr val="tx1"/>
+                </a:solidFill>
+                <a:latin typeface="Courier New" panose="02070309020205020404" pitchFamily="49" charset="0"/>
+                <a:ea typeface="+mn-ea"/>
+                <a:cs typeface="Courier New" panose="02070309020205020404" pitchFamily="49" charset="0"/>
+              </a:rPr>
+              <a:t>')</a:t>
+            </a:r>
+          </a:p>
+          <a:p>
+            <a:endParaRPr lang="en-US" sz="1200" kern="1200" dirty="0" smtClean="0">
+              <a:solidFill>
+                <a:schemeClr val="tx1"/>
+              </a:solidFill>
+              <a:latin typeface="Courier New" panose="02070309020205020404" pitchFamily="49" charset="0"/>
+              <a:ea typeface="+mn-ea"/>
+              <a:cs typeface="Courier New" panose="02070309020205020404" pitchFamily="49" charset="0"/>
+            </a:endParaRPr>
+          </a:p>
+          <a:p>
+            <a:r>
+              <a:rPr lang="en-US" sz="1200" kern="1200" dirty="0" smtClean="0">
+                <a:solidFill>
+                  <a:schemeClr val="tx1"/>
+                </a:solidFill>
+                <a:latin typeface="Courier New" panose="02070309020205020404" pitchFamily="49" charset="0"/>
+                <a:ea typeface="+mn-ea"/>
+                <a:cs typeface="Courier New" panose="02070309020205020404" pitchFamily="49" charset="0"/>
+              </a:rPr>
+              <a:t>SELECT TOP 100 *</a:t>
+            </a:r>
+          </a:p>
+          <a:p>
+            <a:r>
+              <a:rPr lang="en-US" sz="1200" kern="1200" dirty="0" smtClean="0">
+                <a:solidFill>
+                  <a:schemeClr val="tx1"/>
+                </a:solidFill>
+                <a:latin typeface="Courier New" panose="02070309020205020404" pitchFamily="49" charset="0"/>
+                <a:ea typeface="+mn-ea"/>
+                <a:cs typeface="Courier New" panose="02070309020205020404" pitchFamily="49" charset="0"/>
+              </a:rPr>
+              <a:t>FROM [</a:t>
+            </a:r>
+            <a:r>
+              <a:rPr lang="en-US" sz="1200" kern="1200" dirty="0" err="1" smtClean="0">
+                <a:solidFill>
+                  <a:schemeClr val="tx1"/>
+                </a:solidFill>
+                <a:latin typeface="Courier New" panose="02070309020205020404" pitchFamily="49" charset="0"/>
+                <a:ea typeface="+mn-ea"/>
+                <a:cs typeface="Courier New" panose="02070309020205020404" pitchFamily="49" charset="0"/>
+              </a:rPr>
+              <a:t>dbo</a:t>
+            </a:r>
+            <a:r>
+              <a:rPr lang="en-US" sz="1200" kern="1200" dirty="0" smtClean="0">
+                <a:solidFill>
+                  <a:schemeClr val="tx1"/>
+                </a:solidFill>
+                <a:latin typeface="Courier New" panose="02070309020205020404" pitchFamily="49" charset="0"/>
+                <a:ea typeface="+mn-ea"/>
+                <a:cs typeface="Courier New" panose="02070309020205020404" pitchFamily="49" charset="0"/>
+              </a:rPr>
+              <a:t>].[</a:t>
+            </a:r>
+            <a:r>
+              <a:rPr lang="en-US" sz="1200" kern="1200" dirty="0" err="1" smtClean="0">
+                <a:solidFill>
+                  <a:schemeClr val="tx1"/>
+                </a:solidFill>
+                <a:latin typeface="Courier New" panose="02070309020205020404" pitchFamily="49" charset="0"/>
+                <a:ea typeface="+mn-ea"/>
+                <a:cs typeface="Courier New" panose="02070309020205020404" pitchFamily="49" charset="0"/>
+              </a:rPr>
+              <a:t>FactInternetSalesReason</a:t>
+            </a:r>
+            <a:r>
+              <a:rPr lang="en-US" sz="1200" kern="1200" dirty="0" smtClean="0">
+                <a:solidFill>
+                  <a:schemeClr val="tx1"/>
+                </a:solidFill>
+                <a:latin typeface="Courier New" panose="02070309020205020404" pitchFamily="49" charset="0"/>
+                <a:ea typeface="+mn-ea"/>
+                <a:cs typeface="Courier New" panose="02070309020205020404" pitchFamily="49" charset="0"/>
+              </a:rPr>
+              <a:t>]</a:t>
+            </a:r>
+          </a:p>
+          <a:p>
+            <a:r>
+              <a:rPr lang="en-US" sz="1200" kern="1200" dirty="0" smtClean="0">
+                <a:solidFill>
+                  <a:schemeClr val="tx1"/>
+                </a:solidFill>
+                <a:latin typeface="Courier New" panose="02070309020205020404" pitchFamily="49" charset="0"/>
+                <a:ea typeface="+mn-ea"/>
+                <a:cs typeface="Courier New" panose="02070309020205020404" pitchFamily="49" charset="0"/>
+              </a:rPr>
+              <a:t>WHERE </a:t>
+            </a:r>
+            <a:r>
+              <a:rPr lang="en-US" sz="1200" kern="1200" dirty="0" err="1" smtClean="0">
+                <a:solidFill>
+                  <a:schemeClr val="tx1"/>
+                </a:solidFill>
+                <a:latin typeface="Courier New" panose="02070309020205020404" pitchFamily="49" charset="0"/>
+                <a:ea typeface="+mn-ea"/>
+                <a:cs typeface="Courier New" panose="02070309020205020404" pitchFamily="49" charset="0"/>
+              </a:rPr>
+              <a:t>SalesOrderNumber</a:t>
+            </a:r>
+            <a:r>
+              <a:rPr lang="en-US" sz="1200" kern="1200" dirty="0" smtClean="0">
+                <a:solidFill>
+                  <a:schemeClr val="tx1"/>
+                </a:solidFill>
+                <a:latin typeface="Courier New" panose="02070309020205020404" pitchFamily="49" charset="0"/>
+                <a:ea typeface="+mn-ea"/>
+                <a:cs typeface="Courier New" panose="02070309020205020404" pitchFamily="49" charset="0"/>
+              </a:rPr>
+              <a:t> IN ('SO43662','SO51212')</a:t>
+            </a:r>
+          </a:p>
+          <a:p>
+            <a:r>
+              <a:rPr lang="en-US" sz="1200" kern="1200" dirty="0" smtClean="0">
+                <a:solidFill>
+                  <a:schemeClr val="tx1"/>
+                </a:solidFill>
+                <a:latin typeface="Courier New" panose="02070309020205020404" pitchFamily="49" charset="0"/>
+                <a:ea typeface="+mn-ea"/>
+                <a:cs typeface="Courier New" panose="02070309020205020404" pitchFamily="49" charset="0"/>
+              </a:rPr>
+              <a:t>OPTION (LABEL = 'BSW </a:t>
+            </a:r>
+            <a:r>
+              <a:rPr lang="en-US" sz="1200" kern="1200" dirty="0" err="1" smtClean="0">
+                <a:solidFill>
+                  <a:schemeClr val="tx1"/>
+                </a:solidFill>
+                <a:latin typeface="Courier New" panose="02070309020205020404" pitchFamily="49" charset="0"/>
+                <a:ea typeface="+mn-ea"/>
+                <a:cs typeface="Courier New" panose="02070309020205020404" pitchFamily="49" charset="0"/>
+              </a:rPr>
+              <a:t>Qry</a:t>
+            </a:r>
+            <a:r>
+              <a:rPr lang="en-US" sz="1200" kern="1200" dirty="0" smtClean="0">
+                <a:solidFill>
+                  <a:schemeClr val="tx1"/>
+                </a:solidFill>
+                <a:latin typeface="Courier New" panose="02070309020205020404" pitchFamily="49" charset="0"/>
+                <a:ea typeface="+mn-ea"/>
+                <a:cs typeface="Courier New" panose="02070309020205020404" pitchFamily="49" charset="0"/>
+              </a:rPr>
+              <a:t> </a:t>
+            </a:r>
+            <a:r>
+              <a:rPr lang="en-US" sz="1200" kern="1200" dirty="0" err="1" smtClean="0">
+                <a:solidFill>
+                  <a:schemeClr val="tx1"/>
+                </a:solidFill>
+                <a:latin typeface="Courier New" panose="02070309020205020404" pitchFamily="49" charset="0"/>
+                <a:ea typeface="+mn-ea"/>
+                <a:cs typeface="Courier New" panose="02070309020205020404" pitchFamily="49" charset="0"/>
+              </a:rPr>
+              <a:t>InternetSalesReason</a:t>
+            </a:r>
+            <a:r>
+              <a:rPr lang="en-US" sz="1200" kern="1200" dirty="0" smtClean="0">
+                <a:solidFill>
+                  <a:schemeClr val="tx1"/>
+                </a:solidFill>
+                <a:latin typeface="Courier New" panose="02070309020205020404" pitchFamily="49" charset="0"/>
+                <a:ea typeface="+mn-ea"/>
+                <a:cs typeface="Courier New" panose="02070309020205020404" pitchFamily="49" charset="0"/>
+              </a:rPr>
+              <a:t>')</a:t>
+            </a:r>
+          </a:p>
+          <a:p>
+            <a:endParaRPr lang="en-US" sz="1200" kern="1200" dirty="0" smtClean="0">
+              <a:solidFill>
+                <a:schemeClr val="tx1"/>
+              </a:solidFill>
+              <a:latin typeface="Courier New" panose="02070309020205020404" pitchFamily="49" charset="0"/>
+              <a:ea typeface="+mn-ea"/>
+              <a:cs typeface="Courier New" panose="02070309020205020404" pitchFamily="49" charset="0"/>
+            </a:endParaRPr>
+          </a:p>
+          <a:p>
+            <a:r>
+              <a:rPr lang="en-US" sz="1200" kern="1200" dirty="0" smtClean="0">
+                <a:solidFill>
+                  <a:schemeClr val="tx1"/>
+                </a:solidFill>
+                <a:latin typeface="Courier New" panose="02070309020205020404" pitchFamily="49" charset="0"/>
+                <a:ea typeface="+mn-ea"/>
+                <a:cs typeface="Courier New" panose="02070309020205020404" pitchFamily="49" charset="0"/>
+              </a:rPr>
+              <a:t>SELECT TOP 100 *</a:t>
+            </a:r>
+          </a:p>
+          <a:p>
+            <a:r>
+              <a:rPr lang="en-US" sz="1200" kern="1200" dirty="0" smtClean="0">
+                <a:solidFill>
+                  <a:schemeClr val="tx1"/>
+                </a:solidFill>
+                <a:latin typeface="Courier New" panose="02070309020205020404" pitchFamily="49" charset="0"/>
+                <a:ea typeface="+mn-ea"/>
+                <a:cs typeface="Courier New" panose="02070309020205020404" pitchFamily="49" charset="0"/>
+              </a:rPr>
+              <a:t>FROM [</a:t>
+            </a:r>
+            <a:r>
+              <a:rPr lang="en-US" sz="1200" kern="1200" dirty="0" err="1" smtClean="0">
+                <a:solidFill>
+                  <a:schemeClr val="tx1"/>
+                </a:solidFill>
+                <a:latin typeface="Courier New" panose="02070309020205020404" pitchFamily="49" charset="0"/>
+                <a:ea typeface="+mn-ea"/>
+                <a:cs typeface="Courier New" panose="02070309020205020404" pitchFamily="49" charset="0"/>
+              </a:rPr>
+              <a:t>dbo</a:t>
+            </a:r>
+            <a:r>
+              <a:rPr lang="en-US" sz="1200" kern="1200" dirty="0" smtClean="0">
+                <a:solidFill>
+                  <a:schemeClr val="tx1"/>
+                </a:solidFill>
+                <a:latin typeface="Courier New" panose="02070309020205020404" pitchFamily="49" charset="0"/>
+                <a:ea typeface="+mn-ea"/>
+                <a:cs typeface="Courier New" panose="02070309020205020404" pitchFamily="49" charset="0"/>
+              </a:rPr>
+              <a:t>].[</a:t>
+            </a:r>
+            <a:r>
+              <a:rPr lang="en-US" sz="1200" kern="1200" dirty="0" err="1" smtClean="0">
+                <a:solidFill>
+                  <a:schemeClr val="tx1"/>
+                </a:solidFill>
+                <a:latin typeface="Courier New" panose="02070309020205020404" pitchFamily="49" charset="0"/>
+                <a:ea typeface="+mn-ea"/>
+                <a:cs typeface="Courier New" panose="02070309020205020404" pitchFamily="49" charset="0"/>
+              </a:rPr>
+              <a:t>FactSalesQuota</a:t>
+            </a:r>
+            <a:r>
+              <a:rPr lang="en-US" sz="1200" kern="1200" dirty="0" smtClean="0">
+                <a:solidFill>
+                  <a:schemeClr val="tx1"/>
+                </a:solidFill>
+                <a:latin typeface="Courier New" panose="02070309020205020404" pitchFamily="49" charset="0"/>
+                <a:ea typeface="+mn-ea"/>
+                <a:cs typeface="Courier New" panose="02070309020205020404" pitchFamily="49" charset="0"/>
+              </a:rPr>
+              <a:t>]</a:t>
+            </a:r>
+          </a:p>
+          <a:p>
+            <a:r>
+              <a:rPr lang="en-US" sz="1200" kern="1200" dirty="0" smtClean="0">
+                <a:solidFill>
+                  <a:schemeClr val="tx1"/>
+                </a:solidFill>
+                <a:latin typeface="Courier New" panose="02070309020205020404" pitchFamily="49" charset="0"/>
+                <a:ea typeface="+mn-ea"/>
+                <a:cs typeface="Courier New" panose="02070309020205020404" pitchFamily="49" charset="0"/>
+              </a:rPr>
+              <a:t>OPTION (LABEL = 'BSW </a:t>
+            </a:r>
+            <a:r>
+              <a:rPr lang="en-US" sz="1200" kern="1200" dirty="0" err="1" smtClean="0">
+                <a:solidFill>
+                  <a:schemeClr val="tx1"/>
+                </a:solidFill>
+                <a:latin typeface="Courier New" panose="02070309020205020404" pitchFamily="49" charset="0"/>
+                <a:ea typeface="+mn-ea"/>
+                <a:cs typeface="Courier New" panose="02070309020205020404" pitchFamily="49" charset="0"/>
+              </a:rPr>
+              <a:t>Qry</a:t>
+            </a:r>
+            <a:r>
+              <a:rPr lang="en-US" sz="1200" kern="1200" dirty="0" smtClean="0">
+                <a:solidFill>
+                  <a:schemeClr val="tx1"/>
+                </a:solidFill>
+                <a:latin typeface="Courier New" panose="02070309020205020404" pitchFamily="49" charset="0"/>
+                <a:ea typeface="+mn-ea"/>
+                <a:cs typeface="Courier New" panose="02070309020205020404" pitchFamily="49" charset="0"/>
+              </a:rPr>
+              <a:t> </a:t>
+            </a:r>
+            <a:r>
+              <a:rPr lang="en-US" sz="1200" kern="1200" dirty="0" err="1" smtClean="0">
+                <a:solidFill>
+                  <a:schemeClr val="tx1"/>
+                </a:solidFill>
+                <a:latin typeface="Courier New" panose="02070309020205020404" pitchFamily="49" charset="0"/>
+                <a:ea typeface="+mn-ea"/>
+                <a:cs typeface="Courier New" panose="02070309020205020404" pitchFamily="49" charset="0"/>
+              </a:rPr>
+              <a:t>SalesQuota</a:t>
+            </a:r>
+            <a:r>
+              <a:rPr lang="en-US" sz="1200" kern="1200" dirty="0" smtClean="0">
+                <a:solidFill>
+                  <a:schemeClr val="tx1"/>
+                </a:solidFill>
+                <a:latin typeface="Courier New" panose="02070309020205020404" pitchFamily="49" charset="0"/>
+                <a:ea typeface="+mn-ea"/>
+                <a:cs typeface="Courier New" panose="02070309020205020404" pitchFamily="49" charset="0"/>
+              </a:rPr>
+              <a:t>')</a:t>
+            </a:r>
+          </a:p>
+          <a:p>
+            <a:endParaRPr lang="en-US" sz="1200" kern="1200" dirty="0" smtClean="0">
+              <a:solidFill>
+                <a:schemeClr val="tx1"/>
+              </a:solidFill>
+              <a:latin typeface="Courier New" panose="02070309020205020404" pitchFamily="49" charset="0"/>
+              <a:ea typeface="+mn-ea"/>
+              <a:cs typeface="Courier New" panose="02070309020205020404" pitchFamily="49" charset="0"/>
+            </a:endParaRPr>
+          </a:p>
+          <a:p>
+            <a:r>
+              <a:rPr lang="en-US" sz="1200" kern="1200" dirty="0" smtClean="0">
+                <a:solidFill>
+                  <a:schemeClr val="tx1"/>
+                </a:solidFill>
+                <a:latin typeface="Courier New" panose="02070309020205020404" pitchFamily="49" charset="0"/>
+                <a:ea typeface="+mn-ea"/>
+                <a:cs typeface="Courier New" panose="02070309020205020404" pitchFamily="49" charset="0"/>
+              </a:rPr>
+              <a:t>SELECT TOP 100 *</a:t>
+            </a:r>
+          </a:p>
+          <a:p>
+            <a:r>
+              <a:rPr lang="en-US" sz="1200" kern="1200" dirty="0" smtClean="0">
+                <a:solidFill>
+                  <a:schemeClr val="tx1"/>
+                </a:solidFill>
+                <a:latin typeface="Courier New" panose="02070309020205020404" pitchFamily="49" charset="0"/>
+                <a:ea typeface="+mn-ea"/>
+                <a:cs typeface="Courier New" panose="02070309020205020404" pitchFamily="49" charset="0"/>
+              </a:rPr>
+              <a:t>FROM [</a:t>
+            </a:r>
+            <a:r>
+              <a:rPr lang="en-US" sz="1200" kern="1200" dirty="0" err="1" smtClean="0">
+                <a:solidFill>
+                  <a:schemeClr val="tx1"/>
+                </a:solidFill>
+                <a:latin typeface="Courier New" panose="02070309020205020404" pitchFamily="49" charset="0"/>
+                <a:ea typeface="+mn-ea"/>
+                <a:cs typeface="Courier New" panose="02070309020205020404" pitchFamily="49" charset="0"/>
+              </a:rPr>
+              <a:t>dbo</a:t>
+            </a:r>
+            <a:r>
+              <a:rPr lang="en-US" sz="1200" kern="1200" dirty="0" smtClean="0">
+                <a:solidFill>
+                  <a:schemeClr val="tx1"/>
+                </a:solidFill>
+                <a:latin typeface="Courier New" panose="02070309020205020404" pitchFamily="49" charset="0"/>
+                <a:ea typeface="+mn-ea"/>
+                <a:cs typeface="Courier New" panose="02070309020205020404" pitchFamily="49" charset="0"/>
+              </a:rPr>
+              <a:t>].[</a:t>
+            </a:r>
+            <a:r>
+              <a:rPr lang="en-US" sz="1200" kern="1200" dirty="0" err="1" smtClean="0">
+                <a:solidFill>
+                  <a:schemeClr val="tx1"/>
+                </a:solidFill>
+                <a:latin typeface="Courier New" panose="02070309020205020404" pitchFamily="49" charset="0"/>
+                <a:ea typeface="+mn-ea"/>
+                <a:cs typeface="Courier New" panose="02070309020205020404" pitchFamily="49" charset="0"/>
+              </a:rPr>
+              <a:t>FactSurveyResponse</a:t>
+            </a:r>
+            <a:r>
+              <a:rPr lang="en-US" sz="1200" kern="1200" dirty="0" smtClean="0">
+                <a:solidFill>
+                  <a:schemeClr val="tx1"/>
+                </a:solidFill>
+                <a:latin typeface="Courier New" panose="02070309020205020404" pitchFamily="49" charset="0"/>
+                <a:ea typeface="+mn-ea"/>
+                <a:cs typeface="Courier New" panose="02070309020205020404" pitchFamily="49" charset="0"/>
+              </a:rPr>
+              <a:t>]</a:t>
+            </a:r>
+          </a:p>
+          <a:p>
+            <a:endParaRPr lang="en-US" sz="1200" kern="1200" dirty="0" smtClean="0">
+              <a:solidFill>
+                <a:schemeClr val="tx1"/>
+              </a:solidFill>
+              <a:latin typeface="Courier New" panose="02070309020205020404" pitchFamily="49" charset="0"/>
+              <a:ea typeface="+mn-ea"/>
+              <a:cs typeface="Courier New" panose="02070309020205020404" pitchFamily="49" charset="0"/>
+            </a:endParaRPr>
+          </a:p>
+          <a:p>
+            <a:r>
+              <a:rPr lang="en-US" sz="1200" kern="1200" dirty="0" smtClean="0">
+                <a:solidFill>
+                  <a:schemeClr val="tx1"/>
+                </a:solidFill>
+                <a:latin typeface="Courier New" panose="02070309020205020404" pitchFamily="49" charset="0"/>
+                <a:ea typeface="+mn-ea"/>
+                <a:cs typeface="Courier New" panose="02070309020205020404" pitchFamily="49" charset="0"/>
+              </a:rPr>
+              <a:t>-- What about Large or Rapidly Changing Dim tables</a:t>
+            </a:r>
+          </a:p>
+          <a:p>
+            <a:r>
+              <a:rPr lang="en-US" sz="1200" kern="1200" dirty="0" smtClean="0">
+                <a:solidFill>
+                  <a:schemeClr val="tx1"/>
+                </a:solidFill>
+                <a:latin typeface="Courier New" panose="02070309020205020404" pitchFamily="49" charset="0"/>
+                <a:ea typeface="+mn-ea"/>
+                <a:cs typeface="Courier New" panose="02070309020205020404" pitchFamily="49" charset="0"/>
+              </a:rPr>
+              <a:t>SELECT *</a:t>
+            </a:r>
+          </a:p>
+          <a:p>
+            <a:r>
+              <a:rPr lang="en-US" sz="1200" kern="1200" dirty="0" smtClean="0">
+                <a:solidFill>
+                  <a:schemeClr val="tx1"/>
+                </a:solidFill>
+                <a:latin typeface="Courier New" panose="02070309020205020404" pitchFamily="49" charset="0"/>
+                <a:ea typeface="+mn-ea"/>
+                <a:cs typeface="Courier New" panose="02070309020205020404" pitchFamily="49" charset="0"/>
+              </a:rPr>
+              <a:t>FROM [</a:t>
+            </a:r>
+            <a:r>
+              <a:rPr lang="en-US" sz="1200" kern="1200" dirty="0" err="1" smtClean="0">
+                <a:solidFill>
+                  <a:schemeClr val="tx1"/>
+                </a:solidFill>
+                <a:latin typeface="Courier New" panose="02070309020205020404" pitchFamily="49" charset="0"/>
+                <a:ea typeface="+mn-ea"/>
+                <a:cs typeface="Courier New" panose="02070309020205020404" pitchFamily="49" charset="0"/>
+              </a:rPr>
+              <a:t>dbo</a:t>
+            </a:r>
+            <a:r>
+              <a:rPr lang="en-US" sz="1200" kern="1200" dirty="0" smtClean="0">
+                <a:solidFill>
+                  <a:schemeClr val="tx1"/>
+                </a:solidFill>
+                <a:latin typeface="Courier New" panose="02070309020205020404" pitchFamily="49" charset="0"/>
+                <a:ea typeface="+mn-ea"/>
+                <a:cs typeface="Courier New" panose="02070309020205020404" pitchFamily="49" charset="0"/>
+              </a:rPr>
+              <a:t>].[</a:t>
+            </a:r>
+            <a:r>
+              <a:rPr lang="en-US" sz="1200" kern="1200" dirty="0" err="1" smtClean="0">
+                <a:solidFill>
+                  <a:schemeClr val="tx1"/>
+                </a:solidFill>
+                <a:latin typeface="Courier New" panose="02070309020205020404" pitchFamily="49" charset="0"/>
+                <a:ea typeface="+mn-ea"/>
+                <a:cs typeface="Courier New" panose="02070309020205020404" pitchFamily="49" charset="0"/>
+              </a:rPr>
+              <a:t>DimReseller</a:t>
+            </a:r>
+            <a:r>
+              <a:rPr lang="en-US" sz="1200" kern="1200" dirty="0" smtClean="0">
+                <a:solidFill>
+                  <a:schemeClr val="tx1"/>
+                </a:solidFill>
+                <a:latin typeface="Courier New" panose="02070309020205020404" pitchFamily="49" charset="0"/>
+                <a:ea typeface="+mn-ea"/>
+                <a:cs typeface="Courier New" panose="02070309020205020404" pitchFamily="49" charset="0"/>
+              </a:rPr>
+              <a:t>]</a:t>
+            </a:r>
+          </a:p>
+          <a:p>
+            <a:r>
+              <a:rPr lang="en-US" sz="1200" kern="1200" dirty="0" smtClean="0">
+                <a:solidFill>
+                  <a:schemeClr val="tx1"/>
+                </a:solidFill>
+                <a:latin typeface="Courier New" panose="02070309020205020404" pitchFamily="49" charset="0"/>
+                <a:ea typeface="+mn-ea"/>
+                <a:cs typeface="Courier New" panose="02070309020205020404" pitchFamily="49" charset="0"/>
+              </a:rPr>
+              <a:t>OPTION (LABEL = 'BSW </a:t>
+            </a:r>
+            <a:r>
+              <a:rPr lang="en-US" sz="1200" kern="1200" dirty="0" err="1" smtClean="0">
+                <a:solidFill>
+                  <a:schemeClr val="tx1"/>
+                </a:solidFill>
+                <a:latin typeface="Courier New" panose="02070309020205020404" pitchFamily="49" charset="0"/>
+                <a:ea typeface="+mn-ea"/>
+                <a:cs typeface="Courier New" panose="02070309020205020404" pitchFamily="49" charset="0"/>
+              </a:rPr>
+              <a:t>Qry</a:t>
+            </a:r>
+            <a:r>
+              <a:rPr lang="en-US" sz="1200" kern="1200" dirty="0" smtClean="0">
+                <a:solidFill>
+                  <a:schemeClr val="tx1"/>
+                </a:solidFill>
+                <a:latin typeface="Courier New" panose="02070309020205020404" pitchFamily="49" charset="0"/>
+                <a:ea typeface="+mn-ea"/>
+                <a:cs typeface="Courier New" panose="02070309020205020404" pitchFamily="49" charset="0"/>
+              </a:rPr>
+              <a:t> </a:t>
+            </a:r>
+            <a:r>
+              <a:rPr lang="en-US" sz="1200" kern="1200" dirty="0" err="1" smtClean="0">
+                <a:solidFill>
+                  <a:schemeClr val="tx1"/>
+                </a:solidFill>
+                <a:latin typeface="Courier New" panose="02070309020205020404" pitchFamily="49" charset="0"/>
+                <a:ea typeface="+mn-ea"/>
+                <a:cs typeface="Courier New" panose="02070309020205020404" pitchFamily="49" charset="0"/>
+              </a:rPr>
+              <a:t>Store_Reseller</a:t>
+            </a:r>
+            <a:r>
+              <a:rPr lang="en-US" sz="1200" kern="1200" dirty="0" smtClean="0">
+                <a:solidFill>
+                  <a:schemeClr val="tx1"/>
+                </a:solidFill>
+                <a:latin typeface="Courier New" panose="02070309020205020404" pitchFamily="49" charset="0"/>
+                <a:ea typeface="+mn-ea"/>
+                <a:cs typeface="Courier New" panose="02070309020205020404" pitchFamily="49" charset="0"/>
+              </a:rPr>
+              <a:t>')</a:t>
+            </a:r>
+          </a:p>
+          <a:p>
+            <a:endParaRPr lang="en-US" sz="1200" kern="1200" dirty="0" smtClean="0">
+              <a:solidFill>
+                <a:schemeClr val="tx1"/>
+              </a:solidFill>
+              <a:latin typeface="Courier New" panose="02070309020205020404" pitchFamily="49" charset="0"/>
+              <a:ea typeface="+mn-ea"/>
+              <a:cs typeface="Courier New" panose="02070309020205020404" pitchFamily="49" charset="0"/>
+            </a:endParaRPr>
+          </a:p>
+          <a:p>
+            <a:r>
+              <a:rPr lang="en-US" sz="1200" kern="1200" dirty="0" smtClean="0">
+                <a:solidFill>
+                  <a:schemeClr val="tx1"/>
+                </a:solidFill>
+                <a:latin typeface="Courier New" panose="02070309020205020404" pitchFamily="49" charset="0"/>
+                <a:ea typeface="+mn-ea"/>
+                <a:cs typeface="Courier New" panose="02070309020205020404" pitchFamily="49" charset="0"/>
+              </a:rPr>
+              <a:t>SELECT *</a:t>
+            </a:r>
+          </a:p>
+          <a:p>
+            <a:r>
+              <a:rPr lang="en-US" sz="1200" kern="1200" dirty="0" smtClean="0">
+                <a:solidFill>
+                  <a:schemeClr val="tx1"/>
+                </a:solidFill>
+                <a:latin typeface="Courier New" panose="02070309020205020404" pitchFamily="49" charset="0"/>
+                <a:ea typeface="+mn-ea"/>
+                <a:cs typeface="Courier New" panose="02070309020205020404" pitchFamily="49" charset="0"/>
+              </a:rPr>
+              <a:t>FROM [</a:t>
+            </a:r>
+            <a:r>
+              <a:rPr lang="en-US" sz="1200" kern="1200" dirty="0" err="1" smtClean="0">
+                <a:solidFill>
+                  <a:schemeClr val="tx1"/>
+                </a:solidFill>
+                <a:latin typeface="Courier New" panose="02070309020205020404" pitchFamily="49" charset="0"/>
+                <a:ea typeface="+mn-ea"/>
+                <a:cs typeface="Courier New" panose="02070309020205020404" pitchFamily="49" charset="0"/>
+              </a:rPr>
+              <a:t>dbo</a:t>
+            </a:r>
+            <a:r>
+              <a:rPr lang="en-US" sz="1200" kern="1200" dirty="0" smtClean="0">
+                <a:solidFill>
+                  <a:schemeClr val="tx1"/>
+                </a:solidFill>
+                <a:latin typeface="Courier New" panose="02070309020205020404" pitchFamily="49" charset="0"/>
+                <a:ea typeface="+mn-ea"/>
+                <a:cs typeface="Courier New" panose="02070309020205020404" pitchFamily="49" charset="0"/>
+              </a:rPr>
+              <a:t>].[</a:t>
+            </a:r>
+            <a:r>
+              <a:rPr lang="en-US" sz="1200" kern="1200" dirty="0" err="1" smtClean="0">
+                <a:solidFill>
+                  <a:schemeClr val="tx1"/>
+                </a:solidFill>
+                <a:latin typeface="Courier New" panose="02070309020205020404" pitchFamily="49" charset="0"/>
+                <a:ea typeface="+mn-ea"/>
+                <a:cs typeface="Courier New" panose="02070309020205020404" pitchFamily="49" charset="0"/>
+              </a:rPr>
+              <a:t>DimCustomer</a:t>
+            </a:r>
+            <a:r>
+              <a:rPr lang="en-US" sz="1200" kern="1200" dirty="0" smtClean="0">
+                <a:solidFill>
+                  <a:schemeClr val="tx1"/>
+                </a:solidFill>
+                <a:latin typeface="Courier New" panose="02070309020205020404" pitchFamily="49" charset="0"/>
+                <a:ea typeface="+mn-ea"/>
+                <a:cs typeface="Courier New" panose="02070309020205020404" pitchFamily="49" charset="0"/>
+              </a:rPr>
+              <a:t>]</a:t>
+            </a:r>
+          </a:p>
+          <a:p>
+            <a:r>
+              <a:rPr lang="en-US" sz="1200" kern="1200" dirty="0" smtClean="0">
+                <a:solidFill>
+                  <a:schemeClr val="tx1"/>
+                </a:solidFill>
+                <a:latin typeface="Courier New" panose="02070309020205020404" pitchFamily="49" charset="0"/>
+                <a:ea typeface="+mn-ea"/>
+                <a:cs typeface="Courier New" panose="02070309020205020404" pitchFamily="49" charset="0"/>
+              </a:rPr>
+              <a:t>OPTION (LABEL = 'BSW </a:t>
+            </a:r>
+            <a:r>
+              <a:rPr lang="en-US" sz="1200" kern="1200" dirty="0" err="1" smtClean="0">
+                <a:solidFill>
+                  <a:schemeClr val="tx1"/>
+                </a:solidFill>
+                <a:latin typeface="Courier New" panose="02070309020205020404" pitchFamily="49" charset="0"/>
+                <a:ea typeface="+mn-ea"/>
+                <a:cs typeface="Courier New" panose="02070309020205020404" pitchFamily="49" charset="0"/>
+              </a:rPr>
+              <a:t>Qry</a:t>
+            </a:r>
+            <a:r>
+              <a:rPr lang="en-US" sz="1200" kern="1200" dirty="0" smtClean="0">
+                <a:solidFill>
+                  <a:schemeClr val="tx1"/>
+                </a:solidFill>
+                <a:latin typeface="Courier New" panose="02070309020205020404" pitchFamily="49" charset="0"/>
+                <a:ea typeface="+mn-ea"/>
+                <a:cs typeface="Courier New" panose="02070309020205020404" pitchFamily="49" charset="0"/>
+              </a:rPr>
+              <a:t> Customer')</a:t>
+            </a:r>
+          </a:p>
+          <a:p>
+            <a:endParaRPr lang="en-US" sz="1200" kern="1200" dirty="0" smtClean="0">
+              <a:solidFill>
+                <a:schemeClr val="tx1"/>
+              </a:solidFill>
+              <a:latin typeface="Courier New" panose="02070309020205020404" pitchFamily="49" charset="0"/>
+              <a:ea typeface="+mn-ea"/>
+              <a:cs typeface="Courier New" panose="02070309020205020404" pitchFamily="49" charset="0"/>
+            </a:endParaRPr>
+          </a:p>
+          <a:p>
+            <a:r>
+              <a:rPr lang="en-US" sz="1200" kern="1200" dirty="0" smtClean="0">
+                <a:solidFill>
+                  <a:schemeClr val="tx1"/>
+                </a:solidFill>
+                <a:latin typeface="Courier New" panose="02070309020205020404" pitchFamily="49" charset="0"/>
+                <a:ea typeface="+mn-ea"/>
+                <a:cs typeface="Courier New" panose="02070309020205020404" pitchFamily="49" charset="0"/>
+              </a:rPr>
+              <a:t>-- Fact Tables where hash may not be obvious or may need to push down hash key from parent table</a:t>
+            </a:r>
+          </a:p>
+          <a:p>
+            <a:r>
+              <a:rPr lang="en-US" sz="1200" kern="1200" dirty="0" smtClean="0">
+                <a:solidFill>
+                  <a:schemeClr val="tx1"/>
+                </a:solidFill>
+                <a:latin typeface="Courier New" panose="02070309020205020404" pitchFamily="49" charset="0"/>
+                <a:ea typeface="+mn-ea"/>
+                <a:cs typeface="Courier New" panose="02070309020205020404" pitchFamily="49" charset="0"/>
+              </a:rPr>
+              <a:t>SELECT TOP 100 *</a:t>
+            </a:r>
+          </a:p>
+          <a:p>
+            <a:r>
+              <a:rPr lang="en-US" sz="1200" kern="1200" dirty="0" smtClean="0">
+                <a:solidFill>
+                  <a:schemeClr val="tx1"/>
+                </a:solidFill>
+                <a:latin typeface="Courier New" panose="02070309020205020404" pitchFamily="49" charset="0"/>
+                <a:ea typeface="+mn-ea"/>
+                <a:cs typeface="Courier New" panose="02070309020205020404" pitchFamily="49" charset="0"/>
+              </a:rPr>
+              <a:t>FROM [</a:t>
+            </a:r>
+            <a:r>
+              <a:rPr lang="en-US" sz="1200" kern="1200" dirty="0" err="1" smtClean="0">
+                <a:solidFill>
+                  <a:schemeClr val="tx1"/>
+                </a:solidFill>
+                <a:latin typeface="Courier New" panose="02070309020205020404" pitchFamily="49" charset="0"/>
+                <a:ea typeface="+mn-ea"/>
+                <a:cs typeface="Courier New" panose="02070309020205020404" pitchFamily="49" charset="0"/>
+              </a:rPr>
+              <a:t>dbo</a:t>
+            </a:r>
+            <a:r>
+              <a:rPr lang="en-US" sz="1200" kern="1200" dirty="0" smtClean="0">
+                <a:solidFill>
+                  <a:schemeClr val="tx1"/>
+                </a:solidFill>
+                <a:latin typeface="Courier New" panose="02070309020205020404" pitchFamily="49" charset="0"/>
+                <a:ea typeface="+mn-ea"/>
+                <a:cs typeface="Courier New" panose="02070309020205020404" pitchFamily="49" charset="0"/>
+              </a:rPr>
+              <a:t>].[</a:t>
+            </a:r>
+            <a:r>
+              <a:rPr lang="en-US" sz="1200" kern="1200" dirty="0" err="1" smtClean="0">
+                <a:solidFill>
+                  <a:schemeClr val="tx1"/>
+                </a:solidFill>
+                <a:latin typeface="Courier New" panose="02070309020205020404" pitchFamily="49" charset="0"/>
+                <a:ea typeface="+mn-ea"/>
+                <a:cs typeface="Courier New" panose="02070309020205020404" pitchFamily="49" charset="0"/>
+              </a:rPr>
+              <a:t>FactCallCenter</a:t>
+            </a:r>
+            <a:r>
+              <a:rPr lang="en-US" sz="1200" kern="1200" dirty="0" smtClean="0">
+                <a:solidFill>
+                  <a:schemeClr val="tx1"/>
+                </a:solidFill>
+                <a:latin typeface="Courier New" panose="02070309020205020404" pitchFamily="49" charset="0"/>
+                <a:ea typeface="+mn-ea"/>
+                <a:cs typeface="Courier New" panose="02070309020205020404" pitchFamily="49" charset="0"/>
+              </a:rPr>
+              <a:t>]</a:t>
+            </a:r>
+          </a:p>
+          <a:p>
+            <a:endParaRPr lang="en-US" sz="1200" kern="1200" dirty="0" smtClean="0">
+              <a:solidFill>
+                <a:schemeClr val="tx1"/>
+              </a:solidFill>
+              <a:latin typeface="Courier New" panose="02070309020205020404" pitchFamily="49" charset="0"/>
+              <a:ea typeface="+mn-ea"/>
+              <a:cs typeface="Courier New" panose="02070309020205020404" pitchFamily="49" charset="0"/>
+            </a:endParaRPr>
+          </a:p>
+          <a:p>
+            <a:r>
+              <a:rPr lang="en-US" sz="1200" kern="1200" dirty="0" smtClean="0">
+                <a:solidFill>
+                  <a:schemeClr val="tx1"/>
+                </a:solidFill>
+                <a:latin typeface="Courier New" panose="02070309020205020404" pitchFamily="49" charset="0"/>
+                <a:ea typeface="+mn-ea"/>
+                <a:cs typeface="Courier New" panose="02070309020205020404" pitchFamily="49" charset="0"/>
+              </a:rPr>
+              <a:t>SELECT TOP 100 *</a:t>
+            </a:r>
+          </a:p>
+          <a:p>
+            <a:r>
+              <a:rPr lang="en-US" sz="1200" kern="1200" dirty="0" smtClean="0">
+                <a:solidFill>
+                  <a:schemeClr val="tx1"/>
+                </a:solidFill>
+                <a:latin typeface="Courier New" panose="02070309020205020404" pitchFamily="49" charset="0"/>
+                <a:ea typeface="+mn-ea"/>
+                <a:cs typeface="Courier New" panose="02070309020205020404" pitchFamily="49" charset="0"/>
+              </a:rPr>
+              <a:t>FROM [</a:t>
+            </a:r>
+            <a:r>
+              <a:rPr lang="en-US" sz="1200" kern="1200" dirty="0" err="1" smtClean="0">
+                <a:solidFill>
+                  <a:schemeClr val="tx1"/>
+                </a:solidFill>
+                <a:latin typeface="Courier New" panose="02070309020205020404" pitchFamily="49" charset="0"/>
+                <a:ea typeface="+mn-ea"/>
+                <a:cs typeface="Courier New" panose="02070309020205020404" pitchFamily="49" charset="0"/>
+              </a:rPr>
+              <a:t>dbo</a:t>
+            </a:r>
+            <a:r>
+              <a:rPr lang="en-US" sz="1200" kern="1200" dirty="0" smtClean="0">
+                <a:solidFill>
+                  <a:schemeClr val="tx1"/>
+                </a:solidFill>
+                <a:latin typeface="Courier New" panose="02070309020205020404" pitchFamily="49" charset="0"/>
+                <a:ea typeface="+mn-ea"/>
+                <a:cs typeface="Courier New" panose="02070309020205020404" pitchFamily="49" charset="0"/>
+              </a:rPr>
+              <a:t>].[</a:t>
+            </a:r>
+            <a:r>
+              <a:rPr lang="en-US" sz="1200" kern="1200" dirty="0" err="1" smtClean="0">
+                <a:solidFill>
+                  <a:schemeClr val="tx1"/>
+                </a:solidFill>
+                <a:latin typeface="Courier New" panose="02070309020205020404" pitchFamily="49" charset="0"/>
+                <a:ea typeface="+mn-ea"/>
+                <a:cs typeface="Courier New" panose="02070309020205020404" pitchFamily="49" charset="0"/>
+              </a:rPr>
+              <a:t>FactCurrencyRate</a:t>
+            </a:r>
+            <a:r>
+              <a:rPr lang="en-US" sz="1200" kern="1200" dirty="0" smtClean="0">
+                <a:solidFill>
+                  <a:schemeClr val="tx1"/>
+                </a:solidFill>
+                <a:latin typeface="Courier New" panose="02070309020205020404" pitchFamily="49" charset="0"/>
+                <a:ea typeface="+mn-ea"/>
+                <a:cs typeface="Courier New" panose="02070309020205020404" pitchFamily="49" charset="0"/>
+              </a:rPr>
+              <a:t>]</a:t>
+            </a:r>
+          </a:p>
+          <a:p>
+            <a:endParaRPr lang="en-US" sz="1200" kern="1200" dirty="0" smtClean="0">
+              <a:solidFill>
+                <a:schemeClr val="tx1"/>
+              </a:solidFill>
+              <a:latin typeface="Courier New" panose="02070309020205020404" pitchFamily="49" charset="0"/>
+              <a:ea typeface="+mn-ea"/>
+              <a:cs typeface="Courier New" panose="02070309020205020404" pitchFamily="49" charset="0"/>
+            </a:endParaRPr>
+          </a:p>
+          <a:p>
+            <a:r>
+              <a:rPr lang="en-US" sz="1200" kern="1200" dirty="0" smtClean="0">
+                <a:solidFill>
+                  <a:schemeClr val="tx1"/>
+                </a:solidFill>
+                <a:latin typeface="Courier New" panose="02070309020205020404" pitchFamily="49" charset="0"/>
+                <a:ea typeface="+mn-ea"/>
+                <a:cs typeface="Courier New" panose="02070309020205020404" pitchFamily="49" charset="0"/>
+              </a:rPr>
+              <a:t>-- Monitor active requests</a:t>
+            </a:r>
+          </a:p>
+          <a:p>
+            <a:r>
+              <a:rPr lang="en-US" sz="1200" kern="1200" dirty="0" smtClean="0">
+                <a:solidFill>
+                  <a:schemeClr val="tx1"/>
+                </a:solidFill>
+                <a:latin typeface="Courier New" panose="02070309020205020404" pitchFamily="49" charset="0"/>
+                <a:ea typeface="+mn-ea"/>
+                <a:cs typeface="Courier New" panose="02070309020205020404" pitchFamily="49" charset="0"/>
+              </a:rPr>
+              <a:t>SELECT </a:t>
+            </a:r>
+            <a:r>
+              <a:rPr lang="en-US" sz="1200" kern="1200" dirty="0" err="1" smtClean="0">
+                <a:solidFill>
+                  <a:schemeClr val="tx1"/>
+                </a:solidFill>
+                <a:latin typeface="Courier New" panose="02070309020205020404" pitchFamily="49" charset="0"/>
+                <a:ea typeface="+mn-ea"/>
+                <a:cs typeface="Courier New" panose="02070309020205020404" pitchFamily="49" charset="0"/>
+              </a:rPr>
+              <a:t>requests.request_id</a:t>
+            </a:r>
+            <a:r>
+              <a:rPr lang="en-US" sz="1200" kern="1200" dirty="0" smtClean="0">
+                <a:solidFill>
+                  <a:schemeClr val="tx1"/>
+                </a:solidFill>
+                <a:latin typeface="Courier New" panose="02070309020205020404" pitchFamily="49" charset="0"/>
+                <a:ea typeface="+mn-ea"/>
+                <a:cs typeface="Courier New" panose="02070309020205020404" pitchFamily="49" charset="0"/>
+              </a:rPr>
+              <a:t> </a:t>
+            </a:r>
+            <a:r>
+              <a:rPr lang="en-US" sz="1200" kern="1200" dirty="0" err="1" smtClean="0">
+                <a:solidFill>
+                  <a:schemeClr val="tx1"/>
+                </a:solidFill>
+                <a:latin typeface="Courier New" panose="02070309020205020404" pitchFamily="49" charset="0"/>
+                <a:ea typeface="+mn-ea"/>
+                <a:cs typeface="Courier New" panose="02070309020205020404" pitchFamily="49" charset="0"/>
+              </a:rPr>
+              <a:t>req_request_id</a:t>
+            </a:r>
+            <a:r>
+              <a:rPr lang="en-US" sz="1200" kern="1200" dirty="0" smtClean="0">
+                <a:solidFill>
+                  <a:schemeClr val="tx1"/>
+                </a:solidFill>
+                <a:latin typeface="Courier New" panose="02070309020205020404" pitchFamily="49" charset="0"/>
+                <a:ea typeface="+mn-ea"/>
+                <a:cs typeface="Courier New" panose="02070309020205020404" pitchFamily="49" charset="0"/>
+              </a:rPr>
+              <a:t>, </a:t>
+            </a:r>
+            <a:r>
+              <a:rPr lang="en-US" sz="1200" kern="1200" dirty="0" err="1" smtClean="0">
+                <a:solidFill>
+                  <a:schemeClr val="tx1"/>
+                </a:solidFill>
+                <a:latin typeface="Courier New" panose="02070309020205020404" pitchFamily="49" charset="0"/>
+                <a:ea typeface="+mn-ea"/>
+                <a:cs typeface="Courier New" panose="02070309020205020404" pitchFamily="49" charset="0"/>
+              </a:rPr>
+              <a:t>jsessions.request_id</a:t>
+            </a:r>
+            <a:r>
+              <a:rPr lang="en-US" sz="1200" kern="1200" dirty="0" smtClean="0">
+                <a:solidFill>
+                  <a:schemeClr val="tx1"/>
+                </a:solidFill>
+                <a:latin typeface="Courier New" panose="02070309020205020404" pitchFamily="49" charset="0"/>
+                <a:ea typeface="+mn-ea"/>
+                <a:cs typeface="Courier New" panose="02070309020205020404" pitchFamily="49" charset="0"/>
+              </a:rPr>
+              <a:t> </a:t>
+            </a:r>
+            <a:r>
+              <a:rPr lang="en-US" sz="1200" kern="1200" dirty="0" err="1" smtClean="0">
+                <a:solidFill>
+                  <a:schemeClr val="tx1"/>
+                </a:solidFill>
+                <a:latin typeface="Courier New" panose="02070309020205020404" pitchFamily="49" charset="0"/>
+                <a:ea typeface="+mn-ea"/>
+                <a:cs typeface="Courier New" panose="02070309020205020404" pitchFamily="49" charset="0"/>
+              </a:rPr>
+              <a:t>sess_request_id</a:t>
+            </a:r>
+            <a:r>
+              <a:rPr lang="en-US" sz="1200" kern="1200" dirty="0" smtClean="0">
+                <a:solidFill>
+                  <a:schemeClr val="tx1"/>
+                </a:solidFill>
+                <a:latin typeface="Courier New" panose="02070309020205020404" pitchFamily="49" charset="0"/>
+                <a:ea typeface="+mn-ea"/>
+                <a:cs typeface="Courier New" panose="02070309020205020404" pitchFamily="49" charset="0"/>
+              </a:rPr>
+              <a:t>, </a:t>
+            </a:r>
+            <a:r>
+              <a:rPr lang="en-US" sz="1200" kern="1200" dirty="0" err="1" smtClean="0">
+                <a:solidFill>
+                  <a:schemeClr val="tx1"/>
+                </a:solidFill>
+                <a:latin typeface="Courier New" panose="02070309020205020404" pitchFamily="49" charset="0"/>
+                <a:ea typeface="+mn-ea"/>
+                <a:cs typeface="Courier New" panose="02070309020205020404" pitchFamily="49" charset="0"/>
+              </a:rPr>
+              <a:t>requests.session_id</a:t>
+            </a:r>
+            <a:r>
+              <a:rPr lang="en-US" sz="1200" kern="1200" dirty="0" smtClean="0">
+                <a:solidFill>
+                  <a:schemeClr val="tx1"/>
+                </a:solidFill>
+                <a:latin typeface="Courier New" panose="02070309020205020404" pitchFamily="49" charset="0"/>
+                <a:ea typeface="+mn-ea"/>
+                <a:cs typeface="Courier New" panose="02070309020205020404" pitchFamily="49" charset="0"/>
+              </a:rPr>
+              <a:t>, requests.[status] </a:t>
+            </a:r>
+            <a:r>
+              <a:rPr lang="en-US" sz="1200" kern="1200" dirty="0" err="1" smtClean="0">
+                <a:solidFill>
+                  <a:schemeClr val="tx1"/>
+                </a:solidFill>
+                <a:latin typeface="Courier New" panose="02070309020205020404" pitchFamily="49" charset="0"/>
+                <a:ea typeface="+mn-ea"/>
+                <a:cs typeface="Courier New" panose="02070309020205020404" pitchFamily="49" charset="0"/>
+              </a:rPr>
+              <a:t>req_status</a:t>
+            </a:r>
+            <a:endParaRPr lang="en-US" sz="1200" kern="1200" dirty="0" smtClean="0">
+              <a:solidFill>
+                <a:schemeClr val="tx1"/>
+              </a:solidFill>
+              <a:latin typeface="Courier New" panose="02070309020205020404" pitchFamily="49" charset="0"/>
+              <a:ea typeface="+mn-ea"/>
+              <a:cs typeface="Courier New" panose="02070309020205020404" pitchFamily="49" charset="0"/>
+            </a:endParaRPr>
+          </a:p>
+          <a:p>
+            <a:r>
+              <a:rPr lang="en-US" sz="1200" kern="1200" dirty="0" smtClean="0">
+                <a:solidFill>
+                  <a:schemeClr val="tx1"/>
+                </a:solidFill>
+                <a:latin typeface="Courier New" panose="02070309020205020404" pitchFamily="49" charset="0"/>
+                <a:ea typeface="+mn-ea"/>
+                <a:cs typeface="Courier New" panose="02070309020205020404" pitchFamily="49" charset="0"/>
+              </a:rPr>
+              <a:t>      ,requests.[</a:t>
+            </a:r>
+            <a:r>
+              <a:rPr lang="en-US" sz="1200" kern="1200" dirty="0" err="1" smtClean="0">
+                <a:solidFill>
+                  <a:schemeClr val="tx1"/>
+                </a:solidFill>
+                <a:latin typeface="Courier New" panose="02070309020205020404" pitchFamily="49" charset="0"/>
+                <a:ea typeface="+mn-ea"/>
+                <a:cs typeface="Courier New" panose="02070309020205020404" pitchFamily="49" charset="0"/>
+              </a:rPr>
+              <a:t>submit_time</a:t>
+            </a:r>
+            <a:r>
+              <a:rPr lang="en-US" sz="1200" kern="1200" dirty="0" smtClean="0">
+                <a:solidFill>
+                  <a:schemeClr val="tx1"/>
+                </a:solidFill>
+                <a:latin typeface="Courier New" panose="02070309020205020404" pitchFamily="49" charset="0"/>
+                <a:ea typeface="+mn-ea"/>
+                <a:cs typeface="Courier New" panose="02070309020205020404" pitchFamily="49" charset="0"/>
+              </a:rPr>
+              <a:t>], requests.[</a:t>
+            </a:r>
+            <a:r>
+              <a:rPr lang="en-US" sz="1200" kern="1200" dirty="0" err="1" smtClean="0">
+                <a:solidFill>
+                  <a:schemeClr val="tx1"/>
+                </a:solidFill>
+                <a:latin typeface="Courier New" panose="02070309020205020404" pitchFamily="49" charset="0"/>
+                <a:ea typeface="+mn-ea"/>
+                <a:cs typeface="Courier New" panose="02070309020205020404" pitchFamily="49" charset="0"/>
+              </a:rPr>
+              <a:t>start_time</a:t>
+            </a:r>
+            <a:r>
+              <a:rPr lang="en-US" sz="1200" kern="1200" dirty="0" smtClean="0">
+                <a:solidFill>
+                  <a:schemeClr val="tx1"/>
+                </a:solidFill>
+                <a:latin typeface="Courier New" panose="02070309020205020404" pitchFamily="49" charset="0"/>
+                <a:ea typeface="+mn-ea"/>
+                <a:cs typeface="Courier New" panose="02070309020205020404" pitchFamily="49" charset="0"/>
+              </a:rPr>
+              <a:t>], requests.[</a:t>
+            </a:r>
+            <a:r>
+              <a:rPr lang="en-US" sz="1200" kern="1200" dirty="0" err="1" smtClean="0">
+                <a:solidFill>
+                  <a:schemeClr val="tx1"/>
+                </a:solidFill>
+                <a:latin typeface="Courier New" panose="02070309020205020404" pitchFamily="49" charset="0"/>
+                <a:ea typeface="+mn-ea"/>
+                <a:cs typeface="Courier New" panose="02070309020205020404" pitchFamily="49" charset="0"/>
+              </a:rPr>
+              <a:t>end_compile_time</a:t>
+            </a:r>
+            <a:r>
+              <a:rPr lang="en-US" sz="1200" kern="1200" dirty="0" smtClean="0">
+                <a:solidFill>
+                  <a:schemeClr val="tx1"/>
+                </a:solidFill>
+                <a:latin typeface="Courier New" panose="02070309020205020404" pitchFamily="49" charset="0"/>
+                <a:ea typeface="+mn-ea"/>
+                <a:cs typeface="Courier New" panose="02070309020205020404" pitchFamily="49" charset="0"/>
+              </a:rPr>
+              <a:t>], requests.[</a:t>
+            </a:r>
+            <a:r>
+              <a:rPr lang="en-US" sz="1200" kern="1200" dirty="0" err="1" smtClean="0">
+                <a:solidFill>
+                  <a:schemeClr val="tx1"/>
+                </a:solidFill>
+                <a:latin typeface="Courier New" panose="02070309020205020404" pitchFamily="49" charset="0"/>
+                <a:ea typeface="+mn-ea"/>
+                <a:cs typeface="Courier New" panose="02070309020205020404" pitchFamily="49" charset="0"/>
+              </a:rPr>
+              <a:t>end_time</a:t>
+            </a:r>
+            <a:r>
+              <a:rPr lang="en-US" sz="1200" kern="1200" dirty="0" smtClean="0">
+                <a:solidFill>
+                  <a:schemeClr val="tx1"/>
+                </a:solidFill>
+                <a:latin typeface="Courier New" panose="02070309020205020404" pitchFamily="49" charset="0"/>
+                <a:ea typeface="+mn-ea"/>
+                <a:cs typeface="Courier New" panose="02070309020205020404" pitchFamily="49" charset="0"/>
+              </a:rPr>
+              <a:t>]</a:t>
+            </a:r>
+          </a:p>
+          <a:p>
+            <a:r>
+              <a:rPr lang="en-US" sz="1200" kern="1200" dirty="0" smtClean="0">
+                <a:solidFill>
+                  <a:schemeClr val="tx1"/>
+                </a:solidFill>
+                <a:latin typeface="Courier New" panose="02070309020205020404" pitchFamily="49" charset="0"/>
+                <a:ea typeface="+mn-ea"/>
+                <a:cs typeface="Courier New" panose="02070309020205020404" pitchFamily="49" charset="0"/>
+              </a:rPr>
+              <a:t>      ,[</a:t>
+            </a:r>
+            <a:r>
+              <a:rPr lang="en-US" sz="1200" kern="1200" dirty="0" err="1" smtClean="0">
+                <a:solidFill>
+                  <a:schemeClr val="tx1"/>
+                </a:solidFill>
+                <a:latin typeface="Courier New" panose="02070309020205020404" pitchFamily="49" charset="0"/>
+                <a:ea typeface="+mn-ea"/>
+                <a:cs typeface="Courier New" panose="02070309020205020404" pitchFamily="49" charset="0"/>
+              </a:rPr>
+              <a:t>total_elapsed_time</a:t>
+            </a:r>
+            <a:r>
+              <a:rPr lang="en-US" sz="1200" kern="1200" dirty="0" smtClean="0">
+                <a:solidFill>
+                  <a:schemeClr val="tx1"/>
+                </a:solidFill>
+                <a:latin typeface="Courier New" panose="02070309020205020404" pitchFamily="49" charset="0"/>
+                <a:ea typeface="+mn-ea"/>
+                <a:cs typeface="Courier New" panose="02070309020205020404" pitchFamily="49" charset="0"/>
+              </a:rPr>
+              <a:t>] --,[</a:t>
+            </a:r>
+            <a:r>
+              <a:rPr lang="en-US" sz="1200" kern="1200" dirty="0" err="1" smtClean="0">
+                <a:solidFill>
+                  <a:schemeClr val="tx1"/>
+                </a:solidFill>
+                <a:latin typeface="Courier New" panose="02070309020205020404" pitchFamily="49" charset="0"/>
+                <a:ea typeface="+mn-ea"/>
+                <a:cs typeface="Courier New" panose="02070309020205020404" pitchFamily="49" charset="0"/>
+              </a:rPr>
+              <a:t>total_elapsed_time</a:t>
+            </a:r>
+            <a:r>
+              <a:rPr lang="en-US" sz="1200" kern="1200" dirty="0" smtClean="0">
+                <a:solidFill>
+                  <a:schemeClr val="tx1"/>
+                </a:solidFill>
+                <a:latin typeface="Courier New" panose="02070309020205020404" pitchFamily="49" charset="0"/>
+                <a:ea typeface="+mn-ea"/>
+                <a:cs typeface="Courier New" panose="02070309020205020404" pitchFamily="49" charset="0"/>
+              </a:rPr>
+              <a:t>]/1000 as [Seconds]</a:t>
+            </a:r>
+          </a:p>
+          <a:p>
+            <a:r>
+              <a:rPr lang="en-US" sz="1200" kern="1200" dirty="0" smtClean="0">
+                <a:solidFill>
+                  <a:schemeClr val="tx1"/>
+                </a:solidFill>
+                <a:latin typeface="Courier New" panose="02070309020205020404" pitchFamily="49" charset="0"/>
+                <a:ea typeface="+mn-ea"/>
+                <a:cs typeface="Courier New" panose="02070309020205020404" pitchFamily="49" charset="0"/>
+              </a:rPr>
+              <a:t>      ,[</a:t>
+            </a:r>
+            <a:r>
+              <a:rPr lang="en-US" sz="1200" kern="1200" dirty="0" err="1" smtClean="0">
+                <a:solidFill>
+                  <a:schemeClr val="tx1"/>
+                </a:solidFill>
+                <a:latin typeface="Courier New" panose="02070309020205020404" pitchFamily="49" charset="0"/>
+                <a:ea typeface="+mn-ea"/>
+                <a:cs typeface="Courier New" panose="02070309020205020404" pitchFamily="49" charset="0"/>
+              </a:rPr>
+              <a:t>total_elapsed_time</a:t>
+            </a:r>
+            <a:r>
+              <a:rPr lang="en-US" sz="1200" kern="1200" dirty="0" smtClean="0">
+                <a:solidFill>
+                  <a:schemeClr val="tx1"/>
+                </a:solidFill>
+                <a:latin typeface="Courier New" panose="02070309020205020404" pitchFamily="49" charset="0"/>
+                <a:ea typeface="+mn-ea"/>
+                <a:cs typeface="Courier New" panose="02070309020205020404" pitchFamily="49" charset="0"/>
+              </a:rPr>
+              <a:t>]/1000/60 as [Minutes]</a:t>
+            </a:r>
+          </a:p>
+          <a:p>
+            <a:r>
+              <a:rPr lang="en-US" sz="1200" kern="1200" dirty="0" smtClean="0">
+                <a:solidFill>
+                  <a:schemeClr val="tx1"/>
+                </a:solidFill>
+                <a:latin typeface="Courier New" panose="02070309020205020404" pitchFamily="49" charset="0"/>
+                <a:ea typeface="+mn-ea"/>
+                <a:cs typeface="Courier New" panose="02070309020205020404" pitchFamily="49" charset="0"/>
+              </a:rPr>
+              <a:t>      ,[label], [</a:t>
+            </a:r>
+            <a:r>
+              <a:rPr lang="en-US" sz="1200" kern="1200" dirty="0" err="1" smtClean="0">
+                <a:solidFill>
+                  <a:schemeClr val="tx1"/>
+                </a:solidFill>
+                <a:latin typeface="Courier New" panose="02070309020205020404" pitchFamily="49" charset="0"/>
+                <a:ea typeface="+mn-ea"/>
+                <a:cs typeface="Courier New" panose="02070309020205020404" pitchFamily="49" charset="0"/>
+              </a:rPr>
+              <a:t>error_id</a:t>
+            </a:r>
+            <a:r>
+              <a:rPr lang="en-US" sz="1200" kern="1200" dirty="0" smtClean="0">
+                <a:solidFill>
+                  <a:schemeClr val="tx1"/>
+                </a:solidFill>
+                <a:latin typeface="Courier New" panose="02070309020205020404" pitchFamily="49" charset="0"/>
+                <a:ea typeface="+mn-ea"/>
+                <a:cs typeface="Courier New" panose="02070309020205020404" pitchFamily="49" charset="0"/>
+              </a:rPr>
+              <a:t>], [</a:t>
+            </a:r>
+            <a:r>
+              <a:rPr lang="en-US" sz="1200" kern="1200" dirty="0" err="1" smtClean="0">
+                <a:solidFill>
+                  <a:schemeClr val="tx1"/>
+                </a:solidFill>
+                <a:latin typeface="Courier New" panose="02070309020205020404" pitchFamily="49" charset="0"/>
+                <a:ea typeface="+mn-ea"/>
+                <a:cs typeface="Courier New" panose="02070309020205020404" pitchFamily="49" charset="0"/>
+              </a:rPr>
+              <a:t>database_id</a:t>
+            </a:r>
+            <a:r>
+              <a:rPr lang="en-US" sz="1200" kern="1200" dirty="0" smtClean="0">
+                <a:solidFill>
+                  <a:schemeClr val="tx1"/>
+                </a:solidFill>
+                <a:latin typeface="Courier New" panose="02070309020205020404" pitchFamily="49" charset="0"/>
+                <a:ea typeface="+mn-ea"/>
+                <a:cs typeface="Courier New" panose="02070309020205020404" pitchFamily="49" charset="0"/>
+              </a:rPr>
+              <a:t>], [command], [</a:t>
+            </a:r>
+            <a:r>
+              <a:rPr lang="en-US" sz="1200" kern="1200" dirty="0" err="1" smtClean="0">
+                <a:solidFill>
+                  <a:schemeClr val="tx1"/>
+                </a:solidFill>
+                <a:latin typeface="Courier New" panose="02070309020205020404" pitchFamily="49" charset="0"/>
+                <a:ea typeface="+mn-ea"/>
+                <a:cs typeface="Courier New" panose="02070309020205020404" pitchFamily="49" charset="0"/>
+              </a:rPr>
+              <a:t>resource_class</a:t>
+            </a:r>
+            <a:r>
+              <a:rPr lang="en-US" sz="1200" kern="1200" dirty="0" smtClean="0">
+                <a:solidFill>
+                  <a:schemeClr val="tx1"/>
+                </a:solidFill>
+                <a:latin typeface="Courier New" panose="02070309020205020404" pitchFamily="49" charset="0"/>
+                <a:ea typeface="+mn-ea"/>
+                <a:cs typeface="Courier New" panose="02070309020205020404" pitchFamily="49" charset="0"/>
+              </a:rPr>
+              <a:t>], </a:t>
+            </a:r>
+            <a:r>
+              <a:rPr lang="en-US" sz="1200" kern="1200" dirty="0" err="1" smtClean="0">
+                <a:solidFill>
+                  <a:schemeClr val="tx1"/>
+                </a:solidFill>
+                <a:latin typeface="Courier New" panose="02070309020205020404" pitchFamily="49" charset="0"/>
+                <a:ea typeface="+mn-ea"/>
+                <a:cs typeface="Courier New" panose="02070309020205020404" pitchFamily="49" charset="0"/>
+              </a:rPr>
+              <a:t>jsessions.status</a:t>
+            </a:r>
+            <a:r>
+              <a:rPr lang="en-US" sz="1200" kern="1200" dirty="0" smtClean="0">
+                <a:solidFill>
+                  <a:schemeClr val="tx1"/>
+                </a:solidFill>
+                <a:latin typeface="Courier New" panose="02070309020205020404" pitchFamily="49" charset="0"/>
+                <a:ea typeface="+mn-ea"/>
+                <a:cs typeface="Courier New" panose="02070309020205020404" pitchFamily="49" charset="0"/>
+              </a:rPr>
+              <a:t> </a:t>
+            </a:r>
+            <a:r>
+              <a:rPr lang="en-US" sz="1200" kern="1200" dirty="0" err="1" smtClean="0">
+                <a:solidFill>
+                  <a:schemeClr val="tx1"/>
+                </a:solidFill>
+                <a:latin typeface="Courier New" panose="02070309020205020404" pitchFamily="49" charset="0"/>
+                <a:ea typeface="+mn-ea"/>
+                <a:cs typeface="Courier New" panose="02070309020205020404" pitchFamily="49" charset="0"/>
+              </a:rPr>
+              <a:t>sess_status</a:t>
+            </a:r>
+            <a:r>
+              <a:rPr lang="en-US" sz="1200" kern="1200" dirty="0" smtClean="0">
+                <a:solidFill>
+                  <a:schemeClr val="tx1"/>
+                </a:solidFill>
+                <a:latin typeface="Courier New" panose="02070309020205020404" pitchFamily="49" charset="0"/>
+                <a:ea typeface="+mn-ea"/>
+                <a:cs typeface="Courier New" panose="02070309020205020404" pitchFamily="49" charset="0"/>
+              </a:rPr>
+              <a:t>, </a:t>
+            </a:r>
+            <a:r>
+              <a:rPr lang="en-US" sz="1200" kern="1200" dirty="0" err="1" smtClean="0">
+                <a:solidFill>
+                  <a:schemeClr val="tx1"/>
+                </a:solidFill>
+                <a:latin typeface="Courier New" panose="02070309020205020404" pitchFamily="49" charset="0"/>
+                <a:ea typeface="+mn-ea"/>
+                <a:cs typeface="Courier New" panose="02070309020205020404" pitchFamily="49" charset="0"/>
+              </a:rPr>
+              <a:t>jsessions.login_name</a:t>
+            </a:r>
+            <a:endParaRPr lang="en-US" sz="1200" kern="1200" dirty="0" smtClean="0">
+              <a:solidFill>
+                <a:schemeClr val="tx1"/>
+              </a:solidFill>
+              <a:latin typeface="Courier New" panose="02070309020205020404" pitchFamily="49" charset="0"/>
+              <a:ea typeface="+mn-ea"/>
+              <a:cs typeface="Courier New" panose="02070309020205020404" pitchFamily="49" charset="0"/>
+            </a:endParaRPr>
+          </a:p>
+          <a:p>
+            <a:r>
+              <a:rPr lang="en-US" sz="1200" kern="1200" smtClean="0">
+                <a:solidFill>
+                  <a:schemeClr val="tx1"/>
+                </a:solidFill>
+                <a:latin typeface="Courier New" panose="02070309020205020404" pitchFamily="49" charset="0"/>
+                <a:ea typeface="+mn-ea"/>
+                <a:cs typeface="Courier New" panose="02070309020205020404" pitchFamily="49" charset="0"/>
+              </a:rPr>
+              <a:t>      ,</a:t>
+            </a:r>
+            <a:r>
+              <a:rPr lang="en-US" sz="1200" kern="1200" dirty="0" err="1" smtClean="0">
+                <a:solidFill>
+                  <a:schemeClr val="tx1"/>
+                </a:solidFill>
+                <a:latin typeface="Courier New" panose="02070309020205020404" pitchFamily="49" charset="0"/>
+                <a:ea typeface="+mn-ea"/>
+                <a:cs typeface="Courier New" panose="02070309020205020404" pitchFamily="49" charset="0"/>
+              </a:rPr>
+              <a:t>jsessions.login_time</a:t>
+            </a:r>
+            <a:r>
+              <a:rPr lang="en-US" sz="1200" kern="1200" dirty="0" smtClean="0">
+                <a:solidFill>
+                  <a:schemeClr val="tx1"/>
+                </a:solidFill>
+                <a:latin typeface="Courier New" panose="02070309020205020404" pitchFamily="49" charset="0"/>
+                <a:ea typeface="+mn-ea"/>
+                <a:cs typeface="Courier New" panose="02070309020205020404" pitchFamily="49" charset="0"/>
+              </a:rPr>
+              <a:t>, </a:t>
+            </a:r>
+            <a:r>
+              <a:rPr lang="en-US" sz="1200" kern="1200" dirty="0" err="1" smtClean="0">
+                <a:solidFill>
+                  <a:schemeClr val="tx1"/>
+                </a:solidFill>
+                <a:latin typeface="Courier New" panose="02070309020205020404" pitchFamily="49" charset="0"/>
+                <a:ea typeface="+mn-ea"/>
+                <a:cs typeface="Courier New" panose="02070309020205020404" pitchFamily="49" charset="0"/>
+              </a:rPr>
+              <a:t>jsessions.Query_count</a:t>
+            </a:r>
+            <a:r>
+              <a:rPr lang="en-US" sz="1200" kern="1200" dirty="0" smtClean="0">
+                <a:solidFill>
+                  <a:schemeClr val="tx1"/>
+                </a:solidFill>
+                <a:latin typeface="Courier New" panose="02070309020205020404" pitchFamily="49" charset="0"/>
+                <a:ea typeface="+mn-ea"/>
+                <a:cs typeface="Courier New" panose="02070309020205020404" pitchFamily="49" charset="0"/>
+              </a:rPr>
+              <a:t>, </a:t>
+            </a:r>
+            <a:r>
+              <a:rPr lang="en-US" sz="1200" kern="1200" dirty="0" err="1" smtClean="0">
+                <a:solidFill>
+                  <a:schemeClr val="tx1"/>
+                </a:solidFill>
+                <a:latin typeface="Courier New" panose="02070309020205020404" pitchFamily="49" charset="0"/>
+                <a:ea typeface="+mn-ea"/>
+                <a:cs typeface="Courier New" panose="02070309020205020404" pitchFamily="49" charset="0"/>
+              </a:rPr>
+              <a:t>jsessions.client_id</a:t>
+            </a:r>
+            <a:r>
+              <a:rPr lang="en-US" sz="1200" kern="1200" dirty="0" smtClean="0">
+                <a:solidFill>
+                  <a:schemeClr val="tx1"/>
+                </a:solidFill>
+                <a:latin typeface="Courier New" panose="02070309020205020404" pitchFamily="49" charset="0"/>
+                <a:ea typeface="+mn-ea"/>
+                <a:cs typeface="Courier New" panose="02070309020205020404" pitchFamily="49" charset="0"/>
+              </a:rPr>
+              <a:t>, </a:t>
+            </a:r>
+            <a:r>
+              <a:rPr lang="en-US" sz="1200" kern="1200" dirty="0" err="1" smtClean="0">
+                <a:solidFill>
+                  <a:schemeClr val="tx1"/>
+                </a:solidFill>
+                <a:latin typeface="Courier New" panose="02070309020205020404" pitchFamily="49" charset="0"/>
+                <a:ea typeface="+mn-ea"/>
+                <a:cs typeface="Courier New" panose="02070309020205020404" pitchFamily="49" charset="0"/>
+              </a:rPr>
+              <a:t>jsessions</a:t>
+            </a:r>
+            <a:r>
+              <a:rPr lang="en-US" sz="1200" kern="1200" dirty="0" smtClean="0">
+                <a:solidFill>
+                  <a:schemeClr val="tx1"/>
+                </a:solidFill>
+                <a:latin typeface="Courier New" panose="02070309020205020404" pitchFamily="49" charset="0"/>
+                <a:ea typeface="+mn-ea"/>
+                <a:cs typeface="Courier New" panose="02070309020205020404" pitchFamily="49" charset="0"/>
+              </a:rPr>
+              <a:t>.[</a:t>
+            </a:r>
+            <a:r>
+              <a:rPr lang="en-US" sz="1200" kern="1200" dirty="0" err="1" smtClean="0">
+                <a:solidFill>
+                  <a:schemeClr val="tx1"/>
+                </a:solidFill>
+                <a:latin typeface="Courier New" panose="02070309020205020404" pitchFamily="49" charset="0"/>
+                <a:ea typeface="+mn-ea"/>
+                <a:cs typeface="Courier New" panose="02070309020205020404" pitchFamily="49" charset="0"/>
+              </a:rPr>
+              <a:t>app_name</a:t>
+            </a:r>
+            <a:r>
+              <a:rPr lang="en-US" sz="1200" kern="1200" dirty="0" smtClean="0">
+                <a:solidFill>
+                  <a:schemeClr val="tx1"/>
+                </a:solidFill>
+                <a:latin typeface="Courier New" panose="02070309020205020404" pitchFamily="49" charset="0"/>
+                <a:ea typeface="+mn-ea"/>
+                <a:cs typeface="Courier New" panose="02070309020205020404" pitchFamily="49" charset="0"/>
+              </a:rPr>
+              <a:t>], </a:t>
+            </a:r>
+            <a:r>
+              <a:rPr lang="en-US" sz="1200" kern="1200" dirty="0" err="1" smtClean="0">
+                <a:solidFill>
+                  <a:schemeClr val="tx1"/>
+                </a:solidFill>
+                <a:latin typeface="Courier New" panose="02070309020205020404" pitchFamily="49" charset="0"/>
+                <a:ea typeface="+mn-ea"/>
+                <a:cs typeface="Courier New" panose="02070309020205020404" pitchFamily="49" charset="0"/>
+              </a:rPr>
+              <a:t>jsessions.sql_spid</a:t>
+            </a:r>
+            <a:endParaRPr lang="en-US" sz="1200" kern="1200" dirty="0" smtClean="0">
+              <a:solidFill>
+                <a:schemeClr val="tx1"/>
+              </a:solidFill>
+              <a:latin typeface="Courier New" panose="02070309020205020404" pitchFamily="49" charset="0"/>
+              <a:ea typeface="+mn-ea"/>
+              <a:cs typeface="Courier New" panose="02070309020205020404" pitchFamily="49" charset="0"/>
+            </a:endParaRPr>
+          </a:p>
+          <a:p>
+            <a:r>
+              <a:rPr lang="en-US" sz="1200" kern="1200" dirty="0" smtClean="0">
+                <a:solidFill>
+                  <a:schemeClr val="tx1"/>
+                </a:solidFill>
+                <a:latin typeface="Courier New" panose="02070309020205020404" pitchFamily="49" charset="0"/>
+                <a:ea typeface="+mn-ea"/>
+                <a:cs typeface="Courier New" panose="02070309020205020404" pitchFamily="49" charset="0"/>
+              </a:rPr>
+              <a:t>FROM </a:t>
+            </a:r>
+            <a:r>
+              <a:rPr lang="en-US" sz="1200" kern="1200" dirty="0" err="1" smtClean="0">
+                <a:solidFill>
+                  <a:schemeClr val="tx1"/>
+                </a:solidFill>
+                <a:latin typeface="Courier New" panose="02070309020205020404" pitchFamily="49" charset="0"/>
+                <a:ea typeface="+mn-ea"/>
+                <a:cs typeface="Courier New" panose="02070309020205020404" pitchFamily="49" charset="0"/>
+              </a:rPr>
+              <a:t>sys.dm_pdw_exec_requests</a:t>
+            </a:r>
+            <a:r>
+              <a:rPr lang="en-US" sz="1200" kern="1200" dirty="0" smtClean="0">
+                <a:solidFill>
+                  <a:schemeClr val="tx1"/>
+                </a:solidFill>
+                <a:latin typeface="Courier New" panose="02070309020205020404" pitchFamily="49" charset="0"/>
+                <a:ea typeface="+mn-ea"/>
+                <a:cs typeface="Courier New" panose="02070309020205020404" pitchFamily="49" charset="0"/>
+              </a:rPr>
+              <a:t> requests</a:t>
+            </a:r>
+          </a:p>
+          <a:p>
+            <a:r>
+              <a:rPr lang="en-US" sz="1200" kern="1200" dirty="0" smtClean="0">
+                <a:solidFill>
+                  <a:schemeClr val="tx1"/>
+                </a:solidFill>
+                <a:latin typeface="Courier New" panose="02070309020205020404" pitchFamily="49" charset="0"/>
+                <a:ea typeface="+mn-ea"/>
+                <a:cs typeface="Courier New" panose="02070309020205020404" pitchFamily="49" charset="0"/>
+              </a:rPr>
+              <a:t>Join </a:t>
+            </a:r>
+            <a:r>
+              <a:rPr lang="en-US" sz="1200" kern="1200" dirty="0" err="1" smtClean="0">
+                <a:solidFill>
+                  <a:schemeClr val="tx1"/>
+                </a:solidFill>
+                <a:latin typeface="Courier New" panose="02070309020205020404" pitchFamily="49" charset="0"/>
+                <a:ea typeface="+mn-ea"/>
+                <a:cs typeface="Courier New" panose="02070309020205020404" pitchFamily="49" charset="0"/>
+              </a:rPr>
+              <a:t>sys.dm_pdw_exec_sessions</a:t>
+            </a:r>
+            <a:r>
+              <a:rPr lang="en-US" sz="1200" kern="1200" dirty="0" smtClean="0">
+                <a:solidFill>
+                  <a:schemeClr val="tx1"/>
+                </a:solidFill>
+                <a:latin typeface="Courier New" panose="02070309020205020404" pitchFamily="49" charset="0"/>
+                <a:ea typeface="+mn-ea"/>
+                <a:cs typeface="Courier New" panose="02070309020205020404" pitchFamily="49" charset="0"/>
+              </a:rPr>
+              <a:t> </a:t>
+            </a:r>
+            <a:r>
+              <a:rPr lang="en-US" sz="1200" kern="1200" dirty="0" err="1" smtClean="0">
+                <a:solidFill>
+                  <a:schemeClr val="tx1"/>
+                </a:solidFill>
+                <a:latin typeface="Courier New" panose="02070309020205020404" pitchFamily="49" charset="0"/>
+                <a:ea typeface="+mn-ea"/>
+                <a:cs typeface="Courier New" panose="02070309020205020404" pitchFamily="49" charset="0"/>
+              </a:rPr>
+              <a:t>jsessions</a:t>
+            </a:r>
+            <a:r>
+              <a:rPr lang="en-US" sz="1200" kern="1200" dirty="0" smtClean="0">
+                <a:solidFill>
+                  <a:schemeClr val="tx1"/>
+                </a:solidFill>
+                <a:latin typeface="Courier New" panose="02070309020205020404" pitchFamily="49" charset="0"/>
+                <a:ea typeface="+mn-ea"/>
+                <a:cs typeface="Courier New" panose="02070309020205020404" pitchFamily="49" charset="0"/>
+              </a:rPr>
+              <a:t> on </a:t>
+            </a:r>
+            <a:r>
+              <a:rPr lang="en-US" sz="1200" kern="1200" dirty="0" err="1" smtClean="0">
+                <a:solidFill>
+                  <a:schemeClr val="tx1"/>
+                </a:solidFill>
+                <a:latin typeface="Courier New" panose="02070309020205020404" pitchFamily="49" charset="0"/>
+                <a:ea typeface="+mn-ea"/>
+                <a:cs typeface="Courier New" panose="02070309020205020404" pitchFamily="49" charset="0"/>
+              </a:rPr>
+              <a:t>jsessions.session_id</a:t>
+            </a:r>
+            <a:r>
+              <a:rPr lang="en-US" sz="1200" kern="1200" dirty="0" smtClean="0">
+                <a:solidFill>
+                  <a:schemeClr val="tx1"/>
+                </a:solidFill>
+                <a:latin typeface="Courier New" panose="02070309020205020404" pitchFamily="49" charset="0"/>
+                <a:ea typeface="+mn-ea"/>
+                <a:cs typeface="Courier New" panose="02070309020205020404" pitchFamily="49" charset="0"/>
+              </a:rPr>
+              <a:t> = </a:t>
+            </a:r>
+            <a:r>
+              <a:rPr lang="en-US" sz="1200" kern="1200" dirty="0" err="1" smtClean="0">
+                <a:solidFill>
+                  <a:schemeClr val="tx1"/>
+                </a:solidFill>
+                <a:latin typeface="Courier New" panose="02070309020205020404" pitchFamily="49" charset="0"/>
+                <a:ea typeface="+mn-ea"/>
+                <a:cs typeface="Courier New" panose="02070309020205020404" pitchFamily="49" charset="0"/>
+              </a:rPr>
+              <a:t>requests.session_id</a:t>
+            </a:r>
+            <a:endParaRPr lang="en-US" sz="1200" kern="1200" dirty="0" smtClean="0">
+              <a:solidFill>
+                <a:schemeClr val="tx1"/>
+              </a:solidFill>
+              <a:latin typeface="Courier New" panose="02070309020205020404" pitchFamily="49" charset="0"/>
+              <a:ea typeface="+mn-ea"/>
+              <a:cs typeface="Courier New" panose="02070309020205020404" pitchFamily="49" charset="0"/>
+            </a:endParaRPr>
+          </a:p>
+          <a:p>
+            <a:r>
+              <a:rPr lang="en-US" sz="1200" kern="1200" dirty="0" smtClean="0">
+                <a:solidFill>
+                  <a:schemeClr val="tx1"/>
+                </a:solidFill>
+                <a:latin typeface="Courier New" panose="02070309020205020404" pitchFamily="49" charset="0"/>
+                <a:ea typeface="+mn-ea"/>
+                <a:cs typeface="Courier New" panose="02070309020205020404" pitchFamily="49" charset="0"/>
+              </a:rPr>
+              <a:t>WHERE 1=1 --</a:t>
+            </a:r>
+            <a:r>
+              <a:rPr lang="en-US" sz="1200" kern="1200" dirty="0" err="1" smtClean="0">
+                <a:solidFill>
+                  <a:schemeClr val="tx1"/>
+                </a:solidFill>
+                <a:latin typeface="Courier New" panose="02070309020205020404" pitchFamily="49" charset="0"/>
+                <a:ea typeface="+mn-ea"/>
+                <a:cs typeface="Courier New" panose="02070309020205020404" pitchFamily="49" charset="0"/>
+              </a:rPr>
+              <a:t>requests.status</a:t>
+            </a:r>
+            <a:r>
+              <a:rPr lang="en-US" sz="1200" kern="1200" dirty="0" smtClean="0">
+                <a:solidFill>
+                  <a:schemeClr val="tx1"/>
+                </a:solidFill>
+                <a:latin typeface="Courier New" panose="02070309020205020404" pitchFamily="49" charset="0"/>
+                <a:ea typeface="+mn-ea"/>
+                <a:cs typeface="Courier New" panose="02070309020205020404" pitchFamily="49" charset="0"/>
+              </a:rPr>
+              <a:t> not in ('</a:t>
+            </a:r>
+            <a:r>
+              <a:rPr lang="en-US" sz="1200" kern="1200" dirty="0" err="1" smtClean="0">
+                <a:solidFill>
+                  <a:schemeClr val="tx1"/>
+                </a:solidFill>
+                <a:latin typeface="Courier New" panose="02070309020205020404" pitchFamily="49" charset="0"/>
+                <a:ea typeface="+mn-ea"/>
+                <a:cs typeface="Courier New" panose="02070309020205020404" pitchFamily="49" charset="0"/>
+              </a:rPr>
+              <a:t>Completed','Failed','Cancelled</a:t>
+            </a:r>
+            <a:r>
+              <a:rPr lang="en-US" sz="1200" kern="1200" dirty="0" smtClean="0">
+                <a:solidFill>
+                  <a:schemeClr val="tx1"/>
+                </a:solidFill>
+                <a:latin typeface="Courier New" panose="02070309020205020404" pitchFamily="49" charset="0"/>
+                <a:ea typeface="+mn-ea"/>
+                <a:cs typeface="Courier New" panose="02070309020205020404" pitchFamily="49" charset="0"/>
+              </a:rPr>
+              <a:t>')</a:t>
+            </a:r>
+          </a:p>
+          <a:p>
+            <a:r>
+              <a:rPr lang="en-US" sz="1200" kern="1200" dirty="0" smtClean="0">
+                <a:solidFill>
+                  <a:schemeClr val="tx1"/>
+                </a:solidFill>
+                <a:latin typeface="Courier New" panose="02070309020205020404" pitchFamily="49" charset="0"/>
+                <a:ea typeface="+mn-ea"/>
+                <a:cs typeface="Courier New" panose="02070309020205020404" pitchFamily="49" charset="0"/>
+              </a:rPr>
+              <a:t>  AND </a:t>
+            </a:r>
+            <a:r>
+              <a:rPr lang="en-US" sz="1200" kern="1200" dirty="0" err="1" smtClean="0">
+                <a:solidFill>
+                  <a:schemeClr val="tx1"/>
+                </a:solidFill>
+                <a:latin typeface="Courier New" panose="02070309020205020404" pitchFamily="49" charset="0"/>
+                <a:ea typeface="+mn-ea"/>
+                <a:cs typeface="Courier New" panose="02070309020205020404" pitchFamily="49" charset="0"/>
+              </a:rPr>
+              <a:t>requests.session_id</a:t>
+            </a:r>
+            <a:r>
+              <a:rPr lang="en-US" sz="1200" kern="1200" dirty="0" smtClean="0">
+                <a:solidFill>
+                  <a:schemeClr val="tx1"/>
+                </a:solidFill>
+                <a:latin typeface="Courier New" panose="02070309020205020404" pitchFamily="49" charset="0"/>
+                <a:ea typeface="+mn-ea"/>
+                <a:cs typeface="Courier New" panose="02070309020205020404" pitchFamily="49" charset="0"/>
+              </a:rPr>
+              <a:t> &lt;&gt; </a:t>
+            </a:r>
+            <a:r>
+              <a:rPr lang="en-US" sz="1200" kern="1200" dirty="0" err="1" smtClean="0">
+                <a:solidFill>
+                  <a:schemeClr val="tx1"/>
+                </a:solidFill>
+                <a:latin typeface="Courier New" panose="02070309020205020404" pitchFamily="49" charset="0"/>
+                <a:ea typeface="+mn-ea"/>
+                <a:cs typeface="Courier New" panose="02070309020205020404" pitchFamily="49" charset="0"/>
+              </a:rPr>
+              <a:t>session_id</a:t>
+            </a:r>
+            <a:r>
+              <a:rPr lang="en-US" sz="1200" kern="1200" dirty="0" smtClean="0">
+                <a:solidFill>
+                  <a:schemeClr val="tx1"/>
+                </a:solidFill>
+                <a:latin typeface="Courier New" panose="02070309020205020404" pitchFamily="49" charset="0"/>
+                <a:ea typeface="+mn-ea"/>
+                <a:cs typeface="Courier New" panose="02070309020205020404" pitchFamily="49" charset="0"/>
+              </a:rPr>
+              <a:t>()</a:t>
+            </a:r>
+          </a:p>
+          <a:p>
+            <a:r>
+              <a:rPr lang="en-US" sz="1200" kern="1200" dirty="0" smtClean="0">
+                <a:solidFill>
+                  <a:schemeClr val="tx1"/>
+                </a:solidFill>
+                <a:latin typeface="Courier New" panose="02070309020205020404" pitchFamily="49" charset="0"/>
+                <a:ea typeface="+mn-ea"/>
+                <a:cs typeface="Courier New" panose="02070309020205020404" pitchFamily="49" charset="0"/>
+              </a:rPr>
+              <a:t>  and </a:t>
+            </a:r>
+            <a:r>
+              <a:rPr lang="en-US" sz="1200" kern="1200" dirty="0" err="1" smtClean="0">
+                <a:solidFill>
+                  <a:schemeClr val="tx1"/>
+                </a:solidFill>
+                <a:latin typeface="Courier New" panose="02070309020205020404" pitchFamily="49" charset="0"/>
+                <a:ea typeface="+mn-ea"/>
+                <a:cs typeface="Courier New" panose="02070309020205020404" pitchFamily="49" charset="0"/>
+              </a:rPr>
+              <a:t>jsessions.sql_spid</a:t>
+            </a:r>
+            <a:r>
+              <a:rPr lang="en-US" sz="1200" kern="1200" dirty="0" smtClean="0">
+                <a:solidFill>
+                  <a:schemeClr val="tx1"/>
+                </a:solidFill>
+                <a:latin typeface="Courier New" panose="02070309020205020404" pitchFamily="49" charset="0"/>
+                <a:ea typeface="+mn-ea"/>
+                <a:cs typeface="Courier New" panose="02070309020205020404" pitchFamily="49" charset="0"/>
+              </a:rPr>
+              <a:t>=237</a:t>
+            </a:r>
+          </a:p>
+          <a:p>
+            <a:r>
+              <a:rPr lang="en-US" sz="1200" kern="1200" dirty="0" smtClean="0">
+                <a:solidFill>
+                  <a:schemeClr val="tx1"/>
+                </a:solidFill>
+                <a:latin typeface="Courier New" panose="02070309020205020404" pitchFamily="49" charset="0"/>
+                <a:ea typeface="+mn-ea"/>
+                <a:cs typeface="Courier New" panose="02070309020205020404" pitchFamily="49" charset="0"/>
+              </a:rPr>
+              <a:t>  and </a:t>
+            </a:r>
+            <a:r>
+              <a:rPr lang="en-US" sz="1200" kern="1200" dirty="0" err="1" smtClean="0">
+                <a:solidFill>
+                  <a:schemeClr val="tx1"/>
+                </a:solidFill>
+                <a:latin typeface="Courier New" panose="02070309020205020404" pitchFamily="49" charset="0"/>
+                <a:ea typeface="+mn-ea"/>
+                <a:cs typeface="Courier New" panose="02070309020205020404" pitchFamily="49" charset="0"/>
+              </a:rPr>
+              <a:t>submit_time</a:t>
+            </a:r>
+            <a:r>
+              <a:rPr lang="en-US" sz="1200" kern="1200" dirty="0" smtClean="0">
+                <a:solidFill>
+                  <a:schemeClr val="tx1"/>
+                </a:solidFill>
+                <a:latin typeface="Courier New" panose="02070309020205020404" pitchFamily="49" charset="0"/>
+                <a:ea typeface="+mn-ea"/>
+                <a:cs typeface="Courier New" panose="02070309020205020404" pitchFamily="49" charset="0"/>
+              </a:rPr>
+              <a:t> &gt; </a:t>
+            </a:r>
+            <a:r>
+              <a:rPr lang="en-US" sz="1200" kern="1200" dirty="0" err="1" smtClean="0">
+                <a:solidFill>
+                  <a:schemeClr val="tx1"/>
+                </a:solidFill>
+                <a:latin typeface="Courier New" panose="02070309020205020404" pitchFamily="49" charset="0"/>
+                <a:ea typeface="+mn-ea"/>
+                <a:cs typeface="Courier New" panose="02070309020205020404" pitchFamily="49" charset="0"/>
+              </a:rPr>
+              <a:t>getdate</a:t>
+            </a:r>
+            <a:r>
+              <a:rPr lang="en-US" sz="1200" kern="1200" dirty="0" smtClean="0">
+                <a:solidFill>
+                  <a:schemeClr val="tx1"/>
+                </a:solidFill>
+                <a:latin typeface="Courier New" panose="02070309020205020404" pitchFamily="49" charset="0"/>
+                <a:ea typeface="+mn-ea"/>
+                <a:cs typeface="Courier New" panose="02070309020205020404" pitchFamily="49" charset="0"/>
+              </a:rPr>
+              <a:t>() -.25</a:t>
+            </a:r>
+          </a:p>
+          <a:p>
+            <a:r>
+              <a:rPr lang="en-US" sz="1200" kern="1200" dirty="0" smtClean="0">
+                <a:solidFill>
+                  <a:schemeClr val="tx1"/>
+                </a:solidFill>
+                <a:latin typeface="Courier New" panose="02070309020205020404" pitchFamily="49" charset="0"/>
+                <a:ea typeface="+mn-ea"/>
+                <a:cs typeface="Courier New" panose="02070309020205020404" pitchFamily="49" charset="0"/>
+              </a:rPr>
+              <a:t>ORDER BY </a:t>
+            </a:r>
+            <a:r>
+              <a:rPr lang="en-US" sz="1200" kern="1200" dirty="0" err="1" smtClean="0">
+                <a:solidFill>
+                  <a:schemeClr val="tx1"/>
+                </a:solidFill>
+                <a:latin typeface="Courier New" panose="02070309020205020404" pitchFamily="49" charset="0"/>
+                <a:ea typeface="+mn-ea"/>
+                <a:cs typeface="Courier New" panose="02070309020205020404" pitchFamily="49" charset="0"/>
+              </a:rPr>
+              <a:t>submit_time</a:t>
+            </a:r>
+            <a:r>
+              <a:rPr lang="en-US" sz="1200" kern="1200" dirty="0" smtClean="0">
+                <a:solidFill>
+                  <a:schemeClr val="tx1"/>
+                </a:solidFill>
+                <a:latin typeface="Courier New" panose="02070309020205020404" pitchFamily="49" charset="0"/>
+                <a:ea typeface="+mn-ea"/>
+                <a:cs typeface="Courier New" panose="02070309020205020404" pitchFamily="49" charset="0"/>
+              </a:rPr>
+              <a:t> DESC</a:t>
+            </a:r>
+            <a:endParaRPr lang="en-US" dirty="0" smtClean="0">
+              <a:latin typeface="Courier New" panose="02070309020205020404" pitchFamily="49" charset="0"/>
+              <a:cs typeface="Courier New" panose="02070309020205020404" pitchFamily="49" charset="0"/>
+            </a:endParaRPr>
           </a:p>
         </p:txBody>
       </p:sp>
@@ -4317,13 +7229,8 @@
             </a:pPr>
             <a:r>
               <a:rPr lang="en-US" sz="1200" dirty="0" smtClean="0"/>
-              <a:t>Email:	</a:t>
-            </a:r>
-            <a:r>
-              <a:rPr lang="en-US" sz="1200" dirty="0" smtClean="0"/>
-              <a:t>Beth.Wolfset@insight.com</a:t>
-            </a:r>
-            <a:endParaRPr lang="en-US" sz="1200" dirty="0" smtClean="0"/>
+              <a:t>Email:	Beth.Wolfset@insight.com</a:t>
+            </a:r>
           </a:p>
           <a:p>
             <a:pPr>
@@ -4342,7 +7249,43 @@
               <a:rPr lang="en-US" sz="1200" dirty="0" smtClean="0"/>
               <a:t>bswolfset@gmail.com </a:t>
             </a:r>
-            <a:endParaRPr lang="en-US" sz="1200" dirty="0" smtClean="0"/>
+          </a:p>
+        </p:txBody>
+      </p:sp>
+      <p:sp>
+        <p:nvSpPr>
+          <p:cNvPr id="5" name="Rectangle 4"/>
+          <p:cNvSpPr/>
+          <p:nvPr/>
+        </p:nvSpPr>
+        <p:spPr>
+          <a:xfrm>
+            <a:off x="5172954" y="4788611"/>
+            <a:ext cx="4060920" cy="300082"/>
+          </a:xfrm>
+          <a:prstGeom prst="rect">
+            <a:avLst/>
+          </a:prstGeom>
+        </p:spPr>
+        <p:txBody>
+          <a:bodyPr wrap="none">
+            <a:spAutoFit/>
+          </a:bodyPr>
+          <a:lstStyle/>
+          <a:p>
+            <a:r>
+              <a:rPr lang="en-US" dirty="0">
+                <a:hlinkClick r:id=""/>
+              </a:rPr>
+              <a:t>https</a:t>
+            </a:r>
+            <a:r>
+              <a:rPr lang="en-US" dirty="0">
+                <a:hlinkClick r:id="rId3"/>
+              </a:rPr>
+              <a:t>://github.com/BSWolfset/PresentationSlidedecks</a:t>
+            </a:r>
+            <a:endParaRPr lang="en-US" dirty="0"/>
           </a:p>
         </p:txBody>
       </p:sp>
@@ -5843,11 +8786,7 @@
             <a:pPr algn="ctr"/>
             <a:r>
               <a:rPr lang="en-US" dirty="0" smtClean="0"/>
-              <a:t>Azure </a:t>
-            </a:r>
-            <a:r>
-              <a:rPr lang="en-US" dirty="0" smtClean="0"/>
-              <a:t>Data Warehouse</a:t>
+              <a:t>Azure Data Warehouse</a:t>
             </a:r>
             <a:endParaRPr lang="en-US" dirty="0"/>
           </a:p>
@@ -8691,11 +11630,7 @@
             <a:p>
               <a:r>
                 <a:rPr lang="en-US" dirty="0"/>
-                <a:t>11012</a:t>
-              </a:r>
-              <a:r>
-                <a:rPr lang="en-US" dirty="0"/>
-                <a:t>	</a:t>
+                <a:t>11012	</a:t>
               </a:r>
               <a:r>
                 <a:rPr lang="en-US" dirty="0" smtClean="0"/>
@@ -9309,11 +12244,7 @@
           <a:p>
             <a:r>
               <a:rPr lang="en-US" dirty="0" smtClean="0"/>
-              <a:t>ADW Tables: </a:t>
-            </a:r>
-            <a:r>
-              <a:rPr lang="en-US" dirty="0" smtClean="0"/>
-              <a:t>Distribution &amp; Storage</a:t>
+              <a:t>ADW Tables: Distribution &amp; Storage</a:t>
             </a:r>
             <a:endParaRPr lang="en-US" dirty="0"/>
           </a:p>
@@ -9931,15 +12862,7 @@
                       </a:r>
                       <a:r>
                         <a:rPr lang="en-US" sz="1400" baseline="0" dirty="0" smtClean="0"/>
-                        <a:t> based on quality and health.  Rebuild CCI </a:t>
-                      </a:r>
-                      <a:r>
-                        <a:rPr lang="en-US" sz="1400" baseline="0" dirty="0" smtClean="0"/>
-                        <a:t>with extra </a:t>
-                      </a:r>
-                      <a:r>
-                        <a:rPr lang="en-US" sz="1400" baseline="0" dirty="0" smtClean="0"/>
-                        <a:t>large resource class</a:t>
+                        <a:t> based on quality and health.  Rebuild CCI with extra large resource class</a:t>
                       </a:r>
                     </a:p>
                     <a:p>
@@ -10205,8 +13128,8 @@
         </p:nvSpPr>
         <p:spPr>
           <a:xfrm>
-            <a:off x="2301499" y="1174755"/>
-            <a:ext cx="4807598" cy="1169551"/>
+            <a:off x="64006" y="1252246"/>
+            <a:ext cx="8452314" cy="2677656"/>
           </a:xfrm>
           <a:prstGeom prst="rect">
             <a:avLst/>
@@ -10214,94 +13137,94 @@
           <a:noFill/>
         </p:spPr>
         <p:txBody>
-          <a:bodyPr wrap="none" rtlCol="0">
+          <a:bodyPr wrap="square" rtlCol="0">
             <a:spAutoFit/>
           </a:bodyPr>
           <a:lstStyle/>
           <a:p>
             <a:r>
-              <a:rPr lang="en-US" sz="1400" dirty="0"/>
+              <a:rPr lang="en-US" sz="2800" dirty="0"/>
               <a:t>Every day I’m </a:t>
             </a:r>
             <a:r>
-              <a:rPr lang="en-US" sz="1400" dirty="0" err="1" smtClean="0"/>
+              <a:rPr lang="en-US" sz="2800" dirty="0" err="1" smtClean="0"/>
               <a:t>shufflin</a:t>
             </a:r>
             <a:r>
-              <a:rPr lang="en-US" sz="1400" dirty="0" smtClean="0"/>
+              <a:rPr lang="en-US" sz="2800" dirty="0" smtClean="0"/>
               <a:t>‘, </a:t>
             </a:r>
           </a:p>
           <a:p>
             <a:r>
-              <a:rPr lang="en-US" sz="1400" dirty="0" err="1" smtClean="0"/>
+              <a:rPr lang="en-US" sz="2800" dirty="0" err="1" smtClean="0"/>
               <a:t>Shufflin</a:t>
             </a:r>
             <a:r>
-              <a:rPr lang="en-US" sz="1400" dirty="0"/>
+              <a:rPr lang="en-US" sz="2800" dirty="0"/>
               <a:t>', </a:t>
             </a:r>
             <a:r>
-              <a:rPr lang="en-US" sz="1400" dirty="0" err="1"/>
+              <a:rPr lang="en-US" sz="2800" dirty="0" err="1"/>
               <a:t>shufflin</a:t>
             </a:r>
             <a:r>
-              <a:rPr lang="en-US" sz="1400" dirty="0"/>
+              <a:rPr lang="en-US" sz="2800" dirty="0"/>
               <a:t>'</a:t>
             </a:r>
           </a:p>
           <a:p>
             <a:r>
-              <a:rPr lang="en-US" sz="1400" dirty="0"/>
+              <a:rPr lang="en-US" sz="2800" dirty="0"/>
               <a:t>Step up fast and be the first </a:t>
             </a:r>
             <a:r>
-              <a:rPr lang="en-US" sz="1400" dirty="0" smtClean="0"/>
+              <a:rPr lang="en-US" sz="2800" dirty="0" smtClean="0"/>
               <a:t>query </a:t>
             </a:r>
             <a:r>
-              <a:rPr lang="en-US" sz="1400" dirty="0"/>
+              <a:rPr lang="en-US" sz="2800" dirty="0"/>
               <a:t>to make me throw this </a:t>
             </a:r>
             <a:r>
-              <a:rPr lang="en-US" sz="1400" dirty="0" smtClean="0"/>
+              <a:rPr lang="en-US" sz="2800" dirty="0" smtClean="0"/>
               <a:t>cache</a:t>
             </a:r>
             <a:r>
-              <a:rPr lang="en-US" sz="1400" dirty="0"/>
+              <a:rPr lang="en-US" sz="2800" dirty="0"/>
               <a:t/>
             </a:r>
             <a:br>
-              <a:rPr lang="en-US" sz="1400" dirty="0"/>
+              <a:rPr lang="en-US" sz="2800" dirty="0"/>
             </a:br>
             <a:r>
-              <a:rPr lang="en-US" sz="1400" dirty="0"/>
+              <a:rPr lang="en-US" sz="2800" dirty="0"/>
               <a:t>We get </a:t>
             </a:r>
             <a:r>
-              <a:rPr lang="en-US" sz="1400" dirty="0" smtClean="0"/>
+              <a:rPr lang="en-US" sz="2800" dirty="0" smtClean="0"/>
               <a:t>memory </a:t>
             </a:r>
             <a:r>
-              <a:rPr lang="en-US" sz="1400" dirty="0"/>
+              <a:rPr lang="en-US" sz="2800" dirty="0"/>
               <a:t>don’t be mad, now stop</a:t>
             </a:r>
             <a:br>
-              <a:rPr lang="en-US" sz="1400" dirty="0"/>
+              <a:rPr lang="en-US" sz="2800" dirty="0"/>
             </a:br>
             <a:r>
-              <a:rPr lang="en-US" sz="1400" dirty="0" smtClean="0"/>
+              <a:rPr lang="en-US" sz="2800" dirty="0" smtClean="0"/>
               <a:t>Data Movement </a:t>
             </a:r>
             <a:r>
-              <a:rPr lang="en-US" sz="1400" dirty="0"/>
+              <a:rPr lang="en-US" sz="2800" dirty="0"/>
               <a:t>is </a:t>
             </a:r>
             <a:r>
-              <a:rPr lang="en-US" sz="1400" dirty="0" smtClean="0"/>
+              <a:rPr lang="en-US" sz="2800" dirty="0" smtClean="0"/>
               <a:t>bad</a:t>
             </a:r>
-            <a:endParaRPr lang="en-US" sz="1400" dirty="0"/>
+            <a:endParaRPr lang="en-US" sz="2800" dirty="0"/>
           </a:p>
         </p:txBody>
       </p:sp>
@@ -10507,11 +13430,7 @@
                       </a:r>
                       <a:r>
                         <a:rPr lang="en-US" sz="1400" baseline="0" dirty="0" smtClean="0"/>
-                        <a:t> </a:t>
-                      </a:r>
-                      <a:r>
-                        <a:rPr lang="en-US" sz="1400" baseline="0" dirty="0" smtClean="0"/>
-                        <a:t>Hash Algorithm </a:t>
+                        <a:t> Hash Algorithm </a:t>
                       </a:r>
                       <a:r>
                         <a:rPr lang="en-US" sz="1400" baseline="0" dirty="0" smtClean="0">
@@ -10521,11 +13440,7 @@
                       </a:r>
                       <a:r>
                         <a:rPr lang="en-US" sz="1400" baseline="0" dirty="0" smtClean="0"/>
-                        <a:t> </a:t>
-                      </a:r>
-                      <a:r>
-                        <a:rPr lang="en-US" sz="1400" baseline="0" dirty="0" smtClean="0"/>
-                        <a:t>New Distribution</a:t>
+                        <a:t> New Distribution</a:t>
                       </a:r>
                     </a:p>
                     <a:p>
@@ -10588,11 +13503,7 @@
                       </a:r>
                       <a:r>
                         <a:rPr lang="en-US" sz="1400" baseline="0" dirty="0" smtClean="0"/>
-                        <a:t> </a:t>
-                      </a:r>
-                      <a:r>
-                        <a:rPr lang="en-US" sz="1400" baseline="0" dirty="0" smtClean="0"/>
-                        <a:t>Replicated (copy to all compute nodes)</a:t>
+                        <a:t> Replicated (copy to all compute nodes)</a:t>
                       </a:r>
                       <a:endParaRPr lang="en-US" sz="1400" dirty="0"/>
                     </a:p>
@@ -10645,11 +13556,7 @@
                       </a:r>
                       <a:r>
                         <a:rPr lang="en-US" sz="1400" dirty="0" smtClean="0"/>
-                        <a:t> </a:t>
-                      </a:r>
-                      <a:r>
-                        <a:rPr lang="en-US" sz="1400" dirty="0" smtClean="0"/>
-                        <a:t>Control Node</a:t>
+                        <a:t> Control Node</a:t>
                       </a:r>
                     </a:p>
                     <a:p>
@@ -10716,11 +13623,7 @@
                       </a:r>
                       <a:r>
                         <a:rPr lang="en-US" sz="1400" baseline="0" dirty="0" smtClean="0"/>
-                        <a:t> </a:t>
-                      </a:r>
-                      <a:r>
-                        <a:rPr lang="en-US" sz="1400" baseline="0" dirty="0" smtClean="0"/>
-                        <a:t>Hash Algorithm </a:t>
+                        <a:t> Hash Algorithm </a:t>
                       </a:r>
                       <a:r>
                         <a:rPr lang="en-US" sz="1400" baseline="0" dirty="0" smtClean="0">
@@ -10730,11 +13633,7 @@
                       </a:r>
                       <a:r>
                         <a:rPr lang="en-US" sz="1400" baseline="0" dirty="0" smtClean="0"/>
-                        <a:t> </a:t>
-                      </a:r>
-                      <a:r>
-                        <a:rPr lang="en-US" sz="1400" baseline="0" dirty="0" smtClean="0"/>
-                        <a:t>New Distribution</a:t>
+                        <a:t> New Distribution</a:t>
                       </a:r>
                     </a:p>
                     <a:p>
@@ -10792,11 +13691,7 @@
                       </a:r>
                       <a:r>
                         <a:rPr lang="en-US" sz="1400" dirty="0" smtClean="0"/>
-                        <a:t> </a:t>
-                      </a:r>
-                      <a:r>
-                        <a:rPr lang="en-US" sz="1400" dirty="0" smtClean="0"/>
-                        <a:t>Round Robin Algorithm </a:t>
+                        <a:t> Round Robin Algorithm </a:t>
                       </a:r>
                       <a:r>
                         <a:rPr lang="en-US" sz="1400" dirty="0" smtClean="0">
@@ -10806,11 +13701,7 @@
                       </a:r>
                       <a:r>
                         <a:rPr lang="en-US" sz="1400" dirty="0" smtClean="0"/>
-                        <a:t> </a:t>
-                      </a:r>
-                      <a:r>
-                        <a:rPr lang="en-US" sz="1400" dirty="0" smtClean="0"/>
-                        <a:t>Round Robin</a:t>
+                        <a:t> Round Robin</a:t>
                       </a:r>
                       <a:r>
                         <a:rPr lang="en-US" sz="1400" baseline="0" dirty="0" smtClean="0"/>
@@ -10871,11 +13762,7 @@
                       </a:r>
                       <a:r>
                         <a:rPr lang="en-US" sz="1400" baseline="0" dirty="0" smtClean="0"/>
-                        <a:t> </a:t>
-                      </a:r>
-                      <a:r>
-                        <a:rPr lang="en-US" sz="1400" baseline="0" dirty="0" smtClean="0"/>
-                        <a:t>Replicated</a:t>
+                        <a:t> Replicated</a:t>
                       </a:r>
                     </a:p>
                     <a:p>
@@ -12542,9 +15429,12 @@
 </file>
 
 <file path=customXml/item1.xml><?xml version="1.0" encoding="utf-8"?>
-<p:properties xmlns:p="http://schemas.microsoft.com/office/2006/metadata/properties" xmlns:xsi="http://www.w3.org/2001/XMLSchema-instance" xmlns:pc="http://schemas.microsoft.com/office/infopath/2007/PartnerControls">
-  <documentManagement/>
-</p:properties>
+<?mso-contentType ?>
+<FormTemplates xmlns="http://schemas.microsoft.com/sharepoint/v3/contenttype/forms">
+  <Display>DocumentLibraryForm</Display>
+  <Edit>DocumentLibraryForm</Edit>
+  <New>DocumentLibraryForm</New>
+</FormTemplates>
 </file>
 
 <file path=customXml/item2.xml><?xml version="1.0" encoding="utf-8"?>
@@ -12747,27 +15637,15 @@
 </file>
 
 <file path=customXml/item3.xml><?xml version="1.0" encoding="utf-8"?>
-<?mso-contentType ?>
-<FormTemplates xmlns="http://schemas.microsoft.com/sharepoint/v3/contenttype/forms">
-  <Display>DocumentLibraryForm</Display>
-  <Edit>DocumentLibraryForm</Edit>
-  <New>DocumentLibraryForm</New>
-</FormTemplates>
+<p:properties xmlns:p="http://schemas.microsoft.com/office/2006/metadata/properties" xmlns:xsi="http://www.w3.org/2001/XMLSchema-instance" xmlns:pc="http://schemas.microsoft.com/office/infopath/2007/PartnerControls">
+  <documentManagement/>
+</p:properties>
 </file>
 
 <file path=customXml/itemProps1.xml><?xml version="1.0" encoding="utf-8"?>
-<ds:datastoreItem xmlns:ds="http://schemas.openxmlformats.org/officeDocument/2006/customXml" ds:itemID="{E714266F-2521-4BD1-B40E-70FEF353EEC2}">
+<ds:datastoreItem xmlns:ds="http://schemas.openxmlformats.org/officeDocument/2006/customXml" ds:itemID="{3A734002-4F6D-49CF-AA2C-43521C1FC708}">
   <ds:schemaRefs>
-    <ds:schemaRef ds:uri="http://purl.org/dc/elements/1.1/"/>
-    <ds:schemaRef ds:uri="http://schemas.microsoft.com/office/2006/metadata/properties"/>
-    <ds:schemaRef ds:uri="68201248-332f-4b19-a564-5b53df1aa731"/>
-    <ds:schemaRef ds:uri="http://purl.org/dc/terms/"/>
-    <ds:schemaRef ds:uri="http://schemas.openxmlformats.org/package/2006/metadata/core-properties"/>
-    <ds:schemaRef ds:uri="http://schemas.microsoft.com/office/2006/documentManagement/types"/>
-    <ds:schemaRef ds:uri="http://schemas.microsoft.com/office/infopath/2007/PartnerControls"/>
-    <ds:schemaRef ds:uri="2c4b7055-2425-4510-9a7f-db214c51849b"/>
-    <ds:schemaRef ds:uri="http://www.w3.org/XML/1998/namespace"/>
-    <ds:schemaRef ds:uri="http://purl.org/dc/dcmitype/"/>
+    <ds:schemaRef ds:uri="http://schemas.microsoft.com/sharepoint/v3/contenttype/forms"/>
   </ds:schemaRefs>
 </ds:datastoreItem>
 </file>
@@ -12792,9 +15670,18 @@
 </file>
 
 <file path=customXml/itemProps3.xml><?xml version="1.0" encoding="utf-8"?>
-<ds:datastoreItem xmlns:ds="http://schemas.openxmlformats.org/officeDocument/2006/customXml" ds:itemID="{3A734002-4F6D-49CF-AA2C-43521C1FC708}">
+<ds:datastoreItem xmlns:ds="http://schemas.openxmlformats.org/officeDocument/2006/customXml" ds:itemID="{E714266F-2521-4BD1-B40E-70FEF353EEC2}">
   <ds:schemaRefs>
-    <ds:schemaRef ds:uri="http://schemas.microsoft.com/sharepoint/v3/contenttype/forms"/>
+    <ds:schemaRef ds:uri="http://purl.org/dc/elements/1.1/"/>
+    <ds:schemaRef ds:uri="http://schemas.microsoft.com/office/2006/metadata/properties"/>
+    <ds:schemaRef ds:uri="68201248-332f-4b19-a564-5b53df1aa731"/>
+    <ds:schemaRef ds:uri="http://purl.org/dc/terms/"/>
+    <ds:schemaRef ds:uri="http://schemas.openxmlformats.org/package/2006/metadata/core-properties"/>
+    <ds:schemaRef ds:uri="http://schemas.microsoft.com/office/2006/documentManagement/types"/>
+    <ds:schemaRef ds:uri="http://schemas.microsoft.com/office/infopath/2007/PartnerControls"/>
+    <ds:schemaRef ds:uri="2c4b7055-2425-4510-9a7f-db214c51849b"/>
+    <ds:schemaRef ds:uri="http://www.w3.org/XML/1998/namespace"/>
+    <ds:schemaRef ds:uri="http://purl.org/dc/dcmitype/"/>
   </ds:schemaRefs>
 </ds:datastoreItem>
 </file>
</xml_diff>

<commit_message>
Added additional resource link
</commit_message>
<xml_diff>
--- a/DesigningForADWPerformance.pptx
+++ b/DesigningForADWPerformance.pptx
@@ -11155,7 +11155,7 @@
         <p:spPr>
           <a:xfrm>
             <a:off x="339318" y="743918"/>
-            <a:ext cx="8520778" cy="3831818"/>
+            <a:ext cx="8520778" cy="4247317"/>
           </a:xfrm>
           <a:prstGeom prst="rect">
             <a:avLst/>
@@ -11169,20 +11169,20 @@
           <a:lstStyle/>
           <a:p>
             <a:r>
-              <a:rPr lang="en-US" b="1" dirty="0"/>
+              <a:rPr lang="en-US" sz="1300" b="1" dirty="0"/>
               <a:t>Designing for Azure Data Warehouse Performance </a:t>
             </a:r>
             <a:r>
-              <a:rPr lang="en-US" dirty="0">
+              <a:rPr lang="en-US" sz="1300" dirty="0">
                 <a:hlinkClick r:id="rId2"/>
               </a:rPr>
               <a:t>–</a:t>
             </a:r>
             <a:r>
-              <a:rPr lang="en-US" dirty="0"/>
+              <a:rPr lang="en-US" sz="1300" dirty="0"/>
               <a:t> Beth Wolfset (other papers and slide decks)</a:t>
             </a:r>
-            <a:endParaRPr lang="en-US" dirty="0">
+            <a:endParaRPr lang="en-US" sz="1300" dirty="0">
               <a:hlinkClick r:id="" action="ppaction://noaction"/>
             </a:endParaRPr>
           </a:p>
@@ -11192,25 +11192,25 @@
               <a:buChar char="•"/>
             </a:pPr>
             <a:r>
-              <a:rPr lang="en-US" dirty="0">
+              <a:rPr lang="en-US" sz="1300" dirty="0">
                 <a:hlinkClick r:id="" action="ppaction://noaction"/>
               </a:rPr>
               <a:t>https</a:t>
             </a:r>
             <a:r>
-              <a:rPr lang="en-US" dirty="0">
+              <a:rPr lang="en-US" sz="1300" dirty="0">
                 <a:hlinkClick r:id="rId2"/>
               </a:rPr>
               <a:t>://github.com/BSWolfset/PresentationSlidedecks</a:t>
             </a:r>
-            <a:endParaRPr lang="en-US" dirty="0"/>
-          </a:p>
-          <a:p>
-            <a:r>
-              <a:rPr lang="en-US" b="1" dirty="0"/>
+            <a:endParaRPr lang="en-US" sz="1300" dirty="0"/>
+          </a:p>
+          <a:p>
+            <a:r>
+              <a:rPr lang="en-US" sz="1300" b="1" dirty="0"/>
               <a:t>Azure Data Warehouse Microsoft Documentation</a:t>
             </a:r>
-            <a:endParaRPr lang="en-US" dirty="0">
+            <a:endParaRPr lang="en-US" sz="1300" dirty="0">
               <a:hlinkClick r:id="" action="ppaction://noaction"/>
             </a:endParaRPr>
           </a:p>
@@ -11220,27 +11220,27 @@
               <a:buChar char="•"/>
             </a:pPr>
             <a:r>
-              <a:rPr lang="en-US" dirty="0">
+              <a:rPr lang="en-US" sz="1300" dirty="0">
                 <a:hlinkClick r:id="" action="ppaction://noaction"/>
               </a:rPr>
               <a:t>https</a:t>
             </a:r>
             <a:r>
-              <a:rPr lang="en-US" dirty="0">
+              <a:rPr lang="en-US" sz="1300" dirty="0">
                 <a:hlinkClick r:id="rId3"/>
               </a:rPr>
               <a:t>://docs.microsoft.com/en-us/azure/sql-data-warehouse/sql-data-warehouse-overview-what-is</a:t>
             </a:r>
-            <a:endParaRPr lang="en-US" dirty="0"/>
-          </a:p>
-          <a:p>
-            <a:r>
-              <a:rPr lang="en-US" b="1" dirty="0"/>
+            <a:endParaRPr lang="en-US" sz="1300" dirty="0"/>
+          </a:p>
+          <a:p>
+            <a:r>
+              <a:rPr lang="en-US" sz="1300" b="1" dirty="0"/>
               <a:t>What is supported</a:t>
             </a:r>
             <a:r>
-              <a:rPr lang="en-US" dirty="0"/>
-              <a:t> - Migrate your SQL code to SQL Data Warehouse</a:t>
+              <a:rPr lang="en-US" sz="1300" dirty="0"/>
+              <a:t> – Design Considerations</a:t>
             </a:r>
           </a:p>
           <a:p>
@@ -11249,19 +11249,12 @@
               <a:buChar char="•"/>
             </a:pPr>
             <a:r>
-              <a:rPr lang="en-US" dirty="0">
+              <a:rPr lang="en-US" sz="1300" dirty="0">
                 <a:hlinkClick r:id="rId4"/>
               </a:rPr>
               <a:t>https://docs.microsoft.com/en-us/azure/sql-data-warehouse/sql-data-warehouse-migrate-code</a:t>
             </a:r>
-            <a:endParaRPr lang="en-US" dirty="0"/>
-          </a:p>
-          <a:p>
-            <a:r>
-              <a:rPr lang="en-US" b="1" dirty="0"/>
-              <a:t>Introduction to Azure SQL Data Warehouse</a:t>
-            </a:r>
-            <a:endParaRPr lang="en-US" dirty="0"/>
+            <a:endParaRPr lang="en-US" sz="1300" dirty="0"/>
           </a:p>
           <a:p>
             <a:pPr marL="285750" indent="-285750">
@@ -11269,15 +11262,19 @@
               <a:buChar char="•"/>
             </a:pPr>
             <a:r>
-              <a:rPr lang="en-US" dirty="0">
+              <a:rPr lang="en-US" sz="1300" dirty="0">
                 <a:hlinkClick r:id="rId5"/>
               </a:rPr>
-              <a:t>https://www.sqlsaturday.com/716/Sessions/Details.aspx?sid=72535</a:t>
-            </a:r>
-            <a:r>
-              <a:rPr lang="en-US" dirty="0"/>
-              <a:t> – Derik Hammer</a:t>
-            </a:r>
+              <a:t>https://docs.microsoft.com/en-us/azure/sql-data-warehouse/sql-data-warehouse-tables-overview#unsupported-table-features</a:t>
+            </a:r>
+            <a:endParaRPr lang="en-US" sz="1300" dirty="0"/>
+          </a:p>
+          <a:p>
+            <a:r>
+              <a:rPr lang="en-US" sz="1300" b="1" dirty="0"/>
+              <a:t>Introduction to Azure SQL Data Warehouse</a:t>
+            </a:r>
+            <a:endParaRPr lang="en-US" sz="1300" dirty="0"/>
           </a:p>
           <a:p>
             <a:pPr marL="285750" indent="-285750">
@@ -11285,24 +11282,14 @@
               <a:buChar char="•"/>
             </a:pPr>
             <a:r>
-              <a:rPr lang="en-US" dirty="0">
+              <a:rPr lang="en-US" sz="1300" dirty="0">
                 <a:hlinkClick r:id="rId6"/>
               </a:rPr>
-              <a:t>https://sqlbits.com/Downloads/595/Robin%20Lester_SQLAzureDataWarehouseSQLBits.pdf</a:t>
-            </a:r>
-            <a:r>
-              <a:rPr lang="en-US" dirty="0"/>
-              <a:t> – Robin Lester</a:t>
-            </a:r>
-          </a:p>
-          <a:p>
-            <a:r>
-              <a:rPr lang="en-US" b="1" dirty="0"/>
-              <a:t>Azure Data Warehouse Performance Tuning -- </a:t>
-            </a:r>
-            <a:r>
-              <a:rPr lang="en-US" dirty="0"/>
-              <a:t>Simon Facer</a:t>
+              <a:t>https://www.sqlsaturday.com/716/Sessions/Details.aspx?sid=72535</a:t>
+            </a:r>
+            <a:r>
+              <a:rPr lang="en-US" sz="1300" dirty="0"/>
+              <a:t> – Derik Hammer</a:t>
             </a:r>
           </a:p>
           <a:p>
@@ -11311,24 +11298,24 @@
               <a:buChar char="•"/>
             </a:pPr>
             <a:r>
-              <a:rPr lang="en-US" dirty="0">
+              <a:rPr lang="en-US" sz="1300" dirty="0">
                 <a:hlinkClick r:id="rId7"/>
               </a:rPr>
-              <a:t>https://www.sqlsaturday.com/716/Sessions/Details.aspx?sid=74668</a:t>
-            </a:r>
-            <a:r>
-              <a:rPr lang="en-US" dirty="0"/>
-              <a:t> </a:t>
-            </a:r>
-          </a:p>
-          <a:p>
-            <a:r>
-              <a:rPr lang="en-US" b="1" dirty="0"/>
-              <a:t>Azure Data Warehouse Query Tuning</a:t>
-            </a:r>
-            <a:r>
-              <a:rPr lang="en-US" dirty="0"/>
-              <a:t> -- James Rowland-Jones</a:t>
+              <a:t>https://sqlbits.com/Downloads/595/Robin%20Lester_SQLAzureDataWarehouseSQLBits.pdf</a:t>
+            </a:r>
+            <a:r>
+              <a:rPr lang="en-US" sz="1300" dirty="0"/>
+              <a:t> – Robin Lester</a:t>
+            </a:r>
+          </a:p>
+          <a:p>
+            <a:r>
+              <a:rPr lang="en-US" sz="1300" b="1" dirty="0"/>
+              <a:t>Azure Data Warehouse Performance Tuning -- </a:t>
+            </a:r>
+            <a:r>
+              <a:rPr lang="en-US" sz="1300" dirty="0"/>
+              <a:t>Simon Facer</a:t>
             </a:r>
           </a:p>
           <a:p>
@@ -11337,21 +11324,24 @@
               <a:buChar char="•"/>
             </a:pPr>
             <a:r>
-              <a:rPr lang="en-US" dirty="0">
+              <a:rPr lang="en-US" sz="1300" dirty="0">
                 <a:hlinkClick r:id="rId8"/>
               </a:rPr>
-              <a:t>https://sqlbits.com/Sessions/Event15/Advanced_Topics_for_Azure_SQL_Data_Warehouse</a:t>
-            </a:r>
-            <a:endParaRPr lang="en-US" dirty="0"/>
-          </a:p>
-          <a:p>
-            <a:r>
-              <a:rPr lang="en-US" b="1" dirty="0"/>
-              <a:t>How to shoot yourself in the foot with Azure SQL Data Warehouse</a:t>
-            </a:r>
-            <a:r>
-              <a:rPr lang="en-US" dirty="0"/>
-              <a:t> – Greg Galloway</a:t>
+              <a:t>https://www.sqlsaturday.com/716/Sessions/Details.aspx?sid=74668</a:t>
+            </a:r>
+            <a:r>
+              <a:rPr lang="en-US" sz="1300" dirty="0"/>
+              <a:t> </a:t>
+            </a:r>
+          </a:p>
+          <a:p>
+            <a:r>
+              <a:rPr lang="en-US" sz="1300" b="1" dirty="0"/>
+              <a:t>Azure Data Warehouse Query Tuning</a:t>
+            </a:r>
+            <a:r>
+              <a:rPr lang="en-US" sz="1300" dirty="0"/>
+              <a:t> -- James Rowland-Jones</a:t>
             </a:r>
           </a:p>
           <a:p>
@@ -11360,17 +11350,21 @@
               <a:buChar char="•"/>
             </a:pPr>
             <a:r>
-              <a:rPr lang="en-US" dirty="0">
+              <a:rPr lang="en-US" sz="1300" dirty="0">
                 <a:hlinkClick r:id="rId9"/>
               </a:rPr>
-              <a:t>https://myignite.techcommunity.microsoft.com/sessions/66194</a:t>
-            </a:r>
-            <a:endParaRPr lang="en-US" dirty="0"/>
-          </a:p>
-          <a:p>
-            <a:r>
-              <a:rPr lang="en-US" b="1" dirty="0"/>
-              <a:t>Data Movement/Shuffling</a:t>
+              <a:t>https://sqlbits.com/Sessions/Event15/Advanced_Topics_for_Azure_SQL_Data_Warehouse</a:t>
+            </a:r>
+            <a:endParaRPr lang="en-US" sz="1300" dirty="0"/>
+          </a:p>
+          <a:p>
+            <a:r>
+              <a:rPr lang="en-US" sz="1300" b="1" dirty="0"/>
+              <a:t>How to shoot yourself in the foot with Azure SQL Data Warehouse</a:t>
+            </a:r>
+            <a:r>
+              <a:rPr lang="en-US" sz="1300" dirty="0"/>
+              <a:t> – Greg Galloway</a:t>
             </a:r>
           </a:p>
           <a:p>
@@ -11379,14 +11373,17 @@
               <a:buChar char="•"/>
             </a:pPr>
             <a:r>
-              <a:rPr lang="en-US" dirty="0">
+              <a:rPr lang="en-US" sz="1300" dirty="0">
                 <a:hlinkClick r:id="rId10"/>
               </a:rPr>
-              <a:t>https://blobeater.blog/2018/04/12/azure-sql-dw-lets-shuffle/</a:t>
-            </a:r>
-            <a:r>
-              <a:rPr lang="en-US" dirty="0"/>
-              <a:t> </a:t>
+              <a:t>https://myignite.techcommunity.microsoft.com/sessions/66194</a:t>
+            </a:r>
+            <a:endParaRPr lang="en-US" sz="1300" dirty="0"/>
+          </a:p>
+          <a:p>
+            <a:r>
+              <a:rPr lang="en-US" sz="1300" b="1" dirty="0"/>
+              <a:t>Data Movement/Shuffling</a:t>
             </a:r>
           </a:p>
           <a:p>
@@ -11395,13 +11392,29 @@
               <a:buChar char="•"/>
             </a:pPr>
             <a:r>
-              <a:rPr lang="en-US" dirty="0">
+              <a:rPr lang="en-US" sz="1300" dirty="0">
                 <a:hlinkClick r:id="rId11"/>
               </a:rPr>
+              <a:t>https://blobeater.blog/2018/04/12/azure-sql-dw-lets-shuffle/</a:t>
+            </a:r>
+            <a:r>
+              <a:rPr lang="en-US" sz="1300" dirty="0"/>
+              <a:t> </a:t>
+            </a:r>
+          </a:p>
+          <a:p>
+            <a:pPr marL="285750" indent="-285750">
+              <a:buFont typeface="Arial" panose="020B0604020202020204" pitchFamily="34" charset="0"/>
+              <a:buChar char="•"/>
+            </a:pPr>
+            <a:r>
+              <a:rPr lang="en-US" sz="1300" dirty="0">
+                <a:hlinkClick r:id="rId12"/>
+              </a:rPr>
               <a:t>https://azure.microsoft.com/en-us/blog/lightning-fast-query-performance-with-azure-sql-data-warehouse/</a:t>
             </a:r>
             <a:r>
-              <a:rPr lang="en-US" dirty="0"/>
+              <a:rPr lang="en-US" sz="1300" dirty="0"/>
               <a:t> </a:t>
             </a:r>
           </a:p>

</xml_diff>

<commit_message>
Includes Queries for monitoring requests/sessions, table sizes, distributions and skew
</commit_message>
<xml_diff>
--- a/DesigningForADWPerformance.pptx
+++ b/DesigningForADWPerformance.pptx
@@ -5,7 +5,7 @@
     <p:sldMasterId id="2147483685" r:id="rId4"/>
   </p:sldMasterIdLst>
   <p:notesMasterIdLst>
-    <p:notesMasterId r:id="rId18"/>
+    <p:notesMasterId r:id="rId19"/>
   </p:notesMasterIdLst>
   <p:sldIdLst>
     <p:sldId id="359" r:id="rId5"/>
@@ -21,6 +21,7 @@
     <p:sldId id="278" r:id="rId15"/>
     <p:sldId id="360" r:id="rId16"/>
     <p:sldId id="358" r:id="rId17"/>
+    <p:sldId id="364" r:id="rId18"/>
   </p:sldIdLst>
   <p:sldSz cx="9144000" cy="5143500" type="screen16x9"/>
   <p:notesSz cx="6858000" cy="9144000"/>
@@ -10247,6 +10248,273 @@
   <p:transition spd="slow">
     <p:push dir="u"/>
   </p:transition>
+</p:sld>
+</file>
+
+<file path=ppt/slides/slide14.xml><?xml version="1.0" encoding="utf-8"?>
+<p:sld xmlns:a="http://schemas.openxmlformats.org/drawingml/2006/main" xmlns:r="http://schemas.openxmlformats.org/officeDocument/2006/relationships" xmlns:p="http://schemas.openxmlformats.org/presentationml/2006/main">
+  <p:cSld>
+    <p:spTree>
+      <p:nvGrpSpPr>
+        <p:cNvPr id="1" name=""/>
+        <p:cNvGrpSpPr/>
+        <p:nvPr/>
+      </p:nvGrpSpPr>
+      <p:grpSpPr>
+        <a:xfrm>
+          <a:off x="0" y="0"/>
+          <a:ext cx="0" cy="0"/>
+          <a:chOff x="0" y="0"/>
+          <a:chExt cx="0" cy="0"/>
+        </a:xfrm>
+      </p:grpSpPr>
+      <p:sp>
+        <p:nvSpPr>
+          <p:cNvPr id="4" name="Title 3">
+            <a:extLst>
+              <a:ext uri="{FF2B5EF4-FFF2-40B4-BE49-F238E27FC236}">
+                <a16:creationId xmlns:a16="http://schemas.microsoft.com/office/drawing/2014/main" id="{071EEC04-F8B3-4271-AB7D-5CA4CF4458BF}"/>
+              </a:ext>
+            </a:extLst>
+          </p:cNvPr>
+          <p:cNvSpPr>
+            <a:spLocks noGrp="1"/>
+          </p:cNvSpPr>
+          <p:nvPr>
+            <p:ph type="title"/>
+          </p:nvPr>
+        </p:nvSpPr>
+        <p:spPr/>
+        <p:txBody>
+          <a:bodyPr/>
+          <a:lstStyle/>
+          <a:p>
+            <a:r>
+              <a:rPr lang="en-US" dirty="0"/>
+              <a:t>Helpful Queries</a:t>
+            </a:r>
+          </a:p>
+        </p:txBody>
+      </p:sp>
+      <p:sp>
+        <p:nvSpPr>
+          <p:cNvPr id="8" name="TextBox 7">
+            <a:extLst>
+              <a:ext uri="{FF2B5EF4-FFF2-40B4-BE49-F238E27FC236}">
+                <a16:creationId xmlns:a16="http://schemas.microsoft.com/office/drawing/2014/main" id="{0E1380CF-E325-49FA-BCDB-13F15E83F652}"/>
+              </a:ext>
+            </a:extLst>
+          </p:cNvPr>
+          <p:cNvSpPr txBox="1"/>
+          <p:nvPr/>
+        </p:nvSpPr>
+        <p:spPr>
+          <a:xfrm>
+            <a:off x="304800" y="873579"/>
+            <a:ext cx="7200900" cy="1754326"/>
+          </a:xfrm>
+          <a:prstGeom prst="rect">
+            <a:avLst/>
+          </a:prstGeom>
+          <a:noFill/>
+        </p:spPr>
+        <p:txBody>
+          <a:bodyPr wrap="square" rtlCol="0">
+            <a:spAutoFit/>
+          </a:bodyPr>
+          <a:lstStyle/>
+          <a:p>
+            <a:r>
+              <a:rPr lang="en-US" dirty="0"/>
+              <a:t>Please note, some are in the notes of slide 11</a:t>
+            </a:r>
+          </a:p>
+          <a:p>
+            <a:endParaRPr lang="en-US" dirty="0"/>
+          </a:p>
+          <a:p>
+            <a:r>
+              <a:rPr lang="en-US" dirty="0" err="1"/>
+              <a:t>ADW_TableDistribution</a:t>
+            </a:r>
+            <a:r>
+              <a:rPr lang="en-US" dirty="0"/>
+              <a:t> is a </a:t>
+            </a:r>
+            <a:r>
+              <a:rPr lang="en-US" dirty="0" err="1"/>
+              <a:t>sql</a:t>
+            </a:r>
+            <a:r>
+              <a:rPr lang="en-US" dirty="0"/>
+              <a:t> file that contains queries to assist with table Size, Distribution and Skew</a:t>
+            </a:r>
+          </a:p>
+          <a:p>
+            <a:endParaRPr lang="en-US" dirty="0"/>
+          </a:p>
+          <a:p>
+            <a:r>
+              <a:rPr lang="en-US" dirty="0" err="1"/>
+              <a:t>ADW_MonitorRequests</a:t>
+            </a:r>
+            <a:r>
+              <a:rPr lang="en-US" dirty="0"/>
+              <a:t> is a </a:t>
+            </a:r>
+            <a:r>
+              <a:rPr lang="en-US" dirty="0" err="1"/>
+              <a:t>sql</a:t>
+            </a:r>
+            <a:r>
+              <a:rPr lang="en-US" dirty="0"/>
+              <a:t> file that contains queries to monitor requests and sessions</a:t>
+            </a:r>
+          </a:p>
+          <a:p>
+            <a:endParaRPr lang="en-US" dirty="0"/>
+          </a:p>
+          <a:p>
+            <a:endParaRPr lang="en-US" dirty="0"/>
+          </a:p>
+        </p:txBody>
+      </p:sp>
+      <p:graphicFrame>
+        <p:nvGraphicFramePr>
+          <p:cNvPr id="9" name="Object 8">
+            <a:extLst>
+              <a:ext uri="{FF2B5EF4-FFF2-40B4-BE49-F238E27FC236}">
+                <a16:creationId xmlns:a16="http://schemas.microsoft.com/office/drawing/2014/main" id="{9BAC4D9F-2DDA-437C-810E-4E2480566393}"/>
+              </a:ext>
+            </a:extLst>
+          </p:cNvPr>
+          <p:cNvGraphicFramePr>
+            <a:graphicFrameLocks noChangeAspect="1"/>
+          </p:cNvGraphicFramePr>
+          <p:nvPr>
+            <p:extLst>
+              <p:ext uri="{D42A27DB-BD31-4B8C-83A1-F6EECF244321}">
+                <p14:modId xmlns:p14="http://schemas.microsoft.com/office/powerpoint/2010/main" val="1975966671"/>
+              </p:ext>
+            </p:extLst>
+          </p:nvPr>
+        </p:nvGraphicFramePr>
+        <p:xfrm>
+          <a:off x="1757226" y="3162300"/>
+          <a:ext cx="1390650" cy="442913"/>
+        </p:xfrm>
+        <a:graphic>
+          <a:graphicData uri="http://schemas.openxmlformats.org/presentationml/2006/ole">
+            <mc:AlternateContent xmlns:mc="http://schemas.openxmlformats.org/markup-compatibility/2006">
+              <mc:Choice xmlns:v="urn:schemas-microsoft-com:vml" Requires="v">
+                <p:oleObj spid="_x0000_s1026" name="Packager Shell Object" showAsIcon="1" r:id="rId3" imgW="1389960" imgH="442800" progId="Package">
+                  <p:embed/>
+                </p:oleObj>
+              </mc:Choice>
+              <mc:Fallback>
+                <p:oleObj name="Packager Shell Object" showAsIcon="1" r:id="rId3" imgW="1389960" imgH="442800" progId="Package">
+                  <p:embed/>
+                  <p:pic>
+                    <p:nvPicPr>
+                      <p:cNvPr id="0" name=""/>
+                      <p:cNvPicPr/>
+                      <p:nvPr/>
+                    </p:nvPicPr>
+                    <p:blipFill>
+                      <a:blip r:embed="rId4"/>
+                      <a:stretch>
+                        <a:fillRect/>
+                      </a:stretch>
+                    </p:blipFill>
+                    <p:spPr>
+                      <a:xfrm>
+                        <a:off x="1757226" y="3162300"/>
+                        <a:ext cx="1390650" cy="442913"/>
+                      </a:xfrm>
+                      <a:prstGeom prst="rect">
+                        <a:avLst/>
+                      </a:prstGeom>
+                    </p:spPr>
+                  </p:pic>
+                </p:oleObj>
+              </mc:Fallback>
+            </mc:AlternateContent>
+          </a:graphicData>
+        </a:graphic>
+      </p:graphicFrame>
+      <p:graphicFrame>
+        <p:nvGraphicFramePr>
+          <p:cNvPr id="10" name="Object 9">
+            <a:extLst>
+              <a:ext uri="{FF2B5EF4-FFF2-40B4-BE49-F238E27FC236}">
+                <a16:creationId xmlns:a16="http://schemas.microsoft.com/office/drawing/2014/main" id="{BB545758-0ECC-487D-A32A-6410828E9DB3}"/>
+              </a:ext>
+            </a:extLst>
+          </p:cNvPr>
+          <p:cNvGraphicFramePr>
+            <a:graphicFrameLocks noChangeAspect="1"/>
+          </p:cNvGraphicFramePr>
+          <p:nvPr>
+            <p:extLst>
+              <p:ext uri="{D42A27DB-BD31-4B8C-83A1-F6EECF244321}">
+                <p14:modId xmlns:p14="http://schemas.microsoft.com/office/powerpoint/2010/main" val="2243340552"/>
+              </p:ext>
+            </p:extLst>
+          </p:nvPr>
+        </p:nvGraphicFramePr>
+        <p:xfrm>
+          <a:off x="4186555" y="3162299"/>
+          <a:ext cx="1403350" cy="442913"/>
+        </p:xfrm>
+        <a:graphic>
+          <a:graphicData uri="http://schemas.openxmlformats.org/presentationml/2006/ole">
+            <mc:AlternateContent xmlns:mc="http://schemas.openxmlformats.org/markup-compatibility/2006">
+              <mc:Choice xmlns:v="urn:schemas-microsoft-com:vml" Requires="v">
+                <p:oleObj spid="_x0000_s1027" name="Packager Shell Object" showAsIcon="1" r:id="rId5" imgW="1402920" imgH="442800" progId="Package">
+                  <p:embed/>
+                </p:oleObj>
+              </mc:Choice>
+              <mc:Fallback>
+                <p:oleObj name="Packager Shell Object" showAsIcon="1" r:id="rId5" imgW="1402920" imgH="442800" progId="Package">
+                  <p:embed/>
+                  <p:pic>
+                    <p:nvPicPr>
+                      <p:cNvPr id="0" name=""/>
+                      <p:cNvPicPr/>
+                      <p:nvPr/>
+                    </p:nvPicPr>
+                    <p:blipFill>
+                      <a:blip r:embed="rId6"/>
+                      <a:stretch>
+                        <a:fillRect/>
+                      </a:stretch>
+                    </p:blipFill>
+                    <p:spPr>
+                      <a:xfrm>
+                        <a:off x="4186555" y="3162299"/>
+                        <a:ext cx="1403350" cy="442913"/>
+                      </a:xfrm>
+                      <a:prstGeom prst="rect">
+                        <a:avLst/>
+                      </a:prstGeom>
+                    </p:spPr>
+                  </p:pic>
+                </p:oleObj>
+              </mc:Fallback>
+            </mc:AlternateContent>
+          </a:graphicData>
+        </a:graphic>
+      </p:graphicFrame>
+    </p:spTree>
+    <p:extLst>
+      <p:ext uri="{BB962C8B-B14F-4D97-AF65-F5344CB8AC3E}">
+        <p14:creationId xmlns:p14="http://schemas.microsoft.com/office/powerpoint/2010/main" val="963468210"/>
+      </p:ext>
+    </p:extLst>
+  </p:cSld>
+  <p:clrMapOvr>
+    <a:masterClrMapping/>
+  </p:clrMapOvr>
 </p:sld>
 </file>
 

</xml_diff>